<commit_message>
Update Homepage notice slide
</commit_message>
<xml_diff>
--- a/assets/img/notice_panel-1.pptx
+++ b/assets/img/notice_panel-1.pptx
@@ -260,7 +260,7 @@
           <a:p>
             <a:fld id="{91C883BF-99AE-42FD-96B8-D02942FEBE9A}" type="datetimeFigureOut">
               <a:rPr lang="ko-KR" altLang="en-US" smtClean="0"/>
-              <a:t>2023-08-25</a:t>
+              <a:t>2024-03-07</a:t>
             </a:fld>
             <a:endParaRPr lang="ko-KR" altLang="en-US" dirty="0"/>
           </a:p>
@@ -458,7 +458,7 @@
           <a:p>
             <a:fld id="{91C883BF-99AE-42FD-96B8-D02942FEBE9A}" type="datetimeFigureOut">
               <a:rPr lang="ko-KR" altLang="en-US" smtClean="0"/>
-              <a:t>2023-08-25</a:t>
+              <a:t>2024-03-07</a:t>
             </a:fld>
             <a:endParaRPr lang="ko-KR" altLang="en-US" dirty="0"/>
           </a:p>
@@ -666,7 +666,7 @@
           <a:p>
             <a:fld id="{91C883BF-99AE-42FD-96B8-D02942FEBE9A}" type="datetimeFigureOut">
               <a:rPr lang="ko-KR" altLang="en-US" smtClean="0"/>
-              <a:t>2023-08-25</a:t>
+              <a:t>2024-03-07</a:t>
             </a:fld>
             <a:endParaRPr lang="ko-KR" altLang="en-US" dirty="0"/>
           </a:p>
@@ -864,7 +864,7 @@
           <a:p>
             <a:fld id="{91C883BF-99AE-42FD-96B8-D02942FEBE9A}" type="datetimeFigureOut">
               <a:rPr lang="ko-KR" altLang="en-US" smtClean="0"/>
-              <a:t>2023-08-25</a:t>
+              <a:t>2024-03-07</a:t>
             </a:fld>
             <a:endParaRPr lang="ko-KR" altLang="en-US" dirty="0"/>
           </a:p>
@@ -1139,7 +1139,7 @@
           <a:p>
             <a:fld id="{91C883BF-99AE-42FD-96B8-D02942FEBE9A}" type="datetimeFigureOut">
               <a:rPr lang="ko-KR" altLang="en-US" smtClean="0"/>
-              <a:t>2023-08-25</a:t>
+              <a:t>2024-03-07</a:t>
             </a:fld>
             <a:endParaRPr lang="ko-KR" altLang="en-US" dirty="0"/>
           </a:p>
@@ -1404,7 +1404,7 @@
           <a:p>
             <a:fld id="{91C883BF-99AE-42FD-96B8-D02942FEBE9A}" type="datetimeFigureOut">
               <a:rPr lang="ko-KR" altLang="en-US" smtClean="0"/>
-              <a:t>2023-08-25</a:t>
+              <a:t>2024-03-07</a:t>
             </a:fld>
             <a:endParaRPr lang="ko-KR" altLang="en-US" dirty="0"/>
           </a:p>
@@ -1816,7 +1816,7 @@
           <a:p>
             <a:fld id="{91C883BF-99AE-42FD-96B8-D02942FEBE9A}" type="datetimeFigureOut">
               <a:rPr lang="ko-KR" altLang="en-US" smtClean="0"/>
-              <a:t>2023-08-25</a:t>
+              <a:t>2024-03-07</a:t>
             </a:fld>
             <a:endParaRPr lang="ko-KR" altLang="en-US" dirty="0"/>
           </a:p>
@@ -1957,7 +1957,7 @@
           <a:p>
             <a:fld id="{91C883BF-99AE-42FD-96B8-D02942FEBE9A}" type="datetimeFigureOut">
               <a:rPr lang="ko-KR" altLang="en-US" smtClean="0"/>
-              <a:t>2023-08-25</a:t>
+              <a:t>2024-03-07</a:t>
             </a:fld>
             <a:endParaRPr lang="ko-KR" altLang="en-US" dirty="0"/>
           </a:p>
@@ -2070,7 +2070,7 @@
           <a:p>
             <a:fld id="{91C883BF-99AE-42FD-96B8-D02942FEBE9A}" type="datetimeFigureOut">
               <a:rPr lang="ko-KR" altLang="en-US" smtClean="0"/>
-              <a:t>2023-08-25</a:t>
+              <a:t>2024-03-07</a:t>
             </a:fld>
             <a:endParaRPr lang="ko-KR" altLang="en-US" dirty="0"/>
           </a:p>
@@ -2381,7 +2381,7 @@
           <a:p>
             <a:fld id="{91C883BF-99AE-42FD-96B8-D02942FEBE9A}" type="datetimeFigureOut">
               <a:rPr lang="ko-KR" altLang="en-US" smtClean="0"/>
-              <a:t>2023-08-25</a:t>
+              <a:t>2024-03-07</a:t>
             </a:fld>
             <a:endParaRPr lang="ko-KR" altLang="en-US" dirty="0"/>
           </a:p>
@@ -2669,7 +2669,7 @@
           <a:p>
             <a:fld id="{91C883BF-99AE-42FD-96B8-D02942FEBE9A}" type="datetimeFigureOut">
               <a:rPr lang="ko-KR" altLang="en-US" smtClean="0"/>
-              <a:t>2023-08-25</a:t>
+              <a:t>2024-03-07</a:t>
             </a:fld>
             <a:endParaRPr lang="ko-KR" altLang="en-US" dirty="0"/>
           </a:p>
@@ -2910,7 +2910,7 @@
           <a:p>
             <a:fld id="{91C883BF-99AE-42FD-96B8-D02942FEBE9A}" type="datetimeFigureOut">
               <a:rPr lang="ko-KR" altLang="en-US" smtClean="0"/>
-              <a:t>2023-08-25</a:t>
+              <a:t>2024-03-07</a:t>
             </a:fld>
             <a:endParaRPr lang="ko-KR" altLang="en-US" dirty="0"/>
           </a:p>
@@ -3336,7 +3336,9 @@
               </a:ext>
             </a:extLst>
           </p:cNvPr>
-          <p:cNvSpPr/>
+          <p:cNvSpPr>
+            <a:spLocks noGrp="1" noRot="1" noMove="1" noResize="1" noEditPoints="1" noAdjustHandles="1" noChangeArrowheads="1" noChangeShapeType="1"/>
+          </p:cNvSpPr>
           <p:nvPr/>
         </p:nvSpPr>
         <p:spPr>
@@ -3485,7 +3487,9 @@
               </a:ext>
             </a:extLst>
           </p:cNvPr>
-          <p:cNvSpPr/>
+          <p:cNvSpPr>
+            <a:spLocks noGrp="1" noRot="1" noMove="1" noResize="1" noEditPoints="1" noAdjustHandles="1" noChangeArrowheads="1" noChangeShapeType="1"/>
+          </p:cNvSpPr>
           <p:nvPr/>
         </p:nvSpPr>
         <p:spPr>
@@ -3540,7 +3544,9 @@
               </a:ext>
             </a:extLst>
           </p:cNvPr>
-          <p:cNvSpPr txBox="1"/>
+          <p:cNvSpPr txBox="1">
+            <a:spLocks noGrp="1" noRot="1" noMove="1" noResize="1" noEditPoints="1" noAdjustHandles="1" noChangeArrowheads="1" noChangeShapeType="1"/>
+          </p:cNvSpPr>
           <p:nvPr/>
         </p:nvSpPr>
         <p:spPr>
@@ -3594,7 +3600,7 @@
             </a:extLst>
           </p:cNvPr>
           <p:cNvCxnSpPr>
-            <a:cxnSpLocks/>
+            <a:cxnSpLocks noGrp="1" noRot="1" noMove="1" noResize="1" noEditPoints="1" noAdjustHandles="1" noChangeArrowheads="1" noChangeShapeType="1"/>
           </p:cNvCxnSpPr>
           <p:nvPr/>
         </p:nvCxnSpPr>
@@ -4789,7 +4795,7 @@
             </a:extLst>
           </p:cNvPr>
           <p:cNvPicPr>
-            <a:picLocks noChangeAspect="1"/>
+            <a:picLocks noGrp="1" noRot="1" noChangeAspect="1" noMove="1" noResize="1" noEditPoints="1" noAdjustHandles="1" noChangeArrowheads="1" noChangeShapeType="1" noCrop="1"/>
           </p:cNvPicPr>
           <p:nvPr/>
         </p:nvPicPr>
@@ -5209,12 +5215,69 @@
           </a:prstGeom>
         </p:spPr>
       </p:pic>
+      <p:sp>
+        <p:nvSpPr>
+          <p:cNvPr id="30" name="직사각형 29">
+            <a:extLst>
+              <a:ext uri="{FF2B5EF4-FFF2-40B4-BE49-F238E27FC236}">
+                <a16:creationId xmlns:a16="http://schemas.microsoft.com/office/drawing/2014/main" id="{77B6E88B-72A3-42DA-BF4B-84AD02D2D0CD}"/>
+              </a:ext>
+            </a:extLst>
+          </p:cNvPr>
+          <p:cNvSpPr/>
+          <p:nvPr/>
+        </p:nvSpPr>
+        <p:spPr>
+          <a:xfrm>
+            <a:off x="1075737" y="2328187"/>
+            <a:ext cx="179532" cy="68247"/>
+          </a:xfrm>
+          <a:prstGeom prst="rect">
+            <a:avLst/>
+          </a:prstGeom>
+          <a:solidFill>
+            <a:schemeClr val="bg1"/>
+          </a:solidFill>
+          <a:ln>
+            <a:solidFill>
+              <a:schemeClr val="bg1"/>
+            </a:solidFill>
+          </a:ln>
+        </p:spPr>
+        <p:style>
+          <a:lnRef idx="2">
+            <a:schemeClr val="accent1">
+              <a:shade val="50000"/>
+            </a:schemeClr>
+          </a:lnRef>
+          <a:fillRef idx="1">
+            <a:schemeClr val="accent1"/>
+          </a:fillRef>
+          <a:effectRef idx="0">
+            <a:schemeClr val="accent1"/>
+          </a:effectRef>
+          <a:fontRef idx="minor">
+            <a:schemeClr val="lt1"/>
+          </a:fontRef>
+        </p:style>
+        <p:txBody>
+          <a:bodyPr rtlCol="0" anchor="ctr"/>
+          <a:lstStyle/>
+          <a:p>
+            <a:pPr algn="ctr"/>
+            <a:endParaRPr lang="ko-KR" altLang="en-US" sz="1600" dirty="0">
+              <a:latin typeface="JejuGothic" panose="02000300000000000000" pitchFamily="2" charset="-127"/>
+              <a:ea typeface="JejuGothic" panose="02000300000000000000" pitchFamily="2" charset="-127"/>
+            </a:endParaRPr>
+          </a:p>
+        </p:txBody>
+      </p:sp>
       <p:grpSp>
         <p:nvGrpSpPr>
-          <p:cNvPr id="1107" name="그룹 1106">
-            <a:extLst>
-              <a:ext uri="{FF2B5EF4-FFF2-40B4-BE49-F238E27FC236}">
-                <a16:creationId xmlns:a16="http://schemas.microsoft.com/office/drawing/2014/main" id="{43C870B6-2EC2-EDDC-EE38-9829447B06A4}"/>
+          <p:cNvPr id="3" name="그룹 2">
+            <a:extLst>
+              <a:ext uri="{FF2B5EF4-FFF2-40B4-BE49-F238E27FC236}">
+                <a16:creationId xmlns:a16="http://schemas.microsoft.com/office/drawing/2014/main" id="{01BC2C2E-2678-89F7-C94E-B049143D05F9}"/>
               </a:ext>
             </a:extLst>
           </p:cNvPr>
@@ -5223,69 +5286,12 @@
         </p:nvGrpSpPr>
         <p:grpSpPr>
           <a:xfrm>
-            <a:off x="571707" y="1160572"/>
-            <a:ext cx="1434439" cy="1903875"/>
-            <a:chOff x="571707" y="1160572"/>
-            <a:chExt cx="1434439" cy="1903875"/>
+            <a:off x="826608" y="1087850"/>
+            <a:ext cx="1176492" cy="169277"/>
+            <a:chOff x="826608" y="1160572"/>
+            <a:chExt cx="1176492" cy="169277"/>
           </a:xfrm>
         </p:grpSpPr>
-        <p:sp>
-          <p:nvSpPr>
-            <p:cNvPr id="30" name="직사각형 29">
-              <a:extLst>
-                <a:ext uri="{FF2B5EF4-FFF2-40B4-BE49-F238E27FC236}">
-                  <a16:creationId xmlns:a16="http://schemas.microsoft.com/office/drawing/2014/main" id="{77B6E88B-72A3-42DA-BF4B-84AD02D2D0CD}"/>
-                </a:ext>
-              </a:extLst>
-            </p:cNvPr>
-            <p:cNvSpPr/>
-            <p:nvPr/>
-          </p:nvSpPr>
-          <p:spPr>
-            <a:xfrm>
-              <a:off x="1075737" y="2458248"/>
-              <a:ext cx="179532" cy="68247"/>
-            </a:xfrm>
-            <a:prstGeom prst="rect">
-              <a:avLst/>
-            </a:prstGeom>
-            <a:solidFill>
-              <a:schemeClr val="bg1"/>
-            </a:solidFill>
-            <a:ln>
-              <a:solidFill>
-                <a:schemeClr val="bg1"/>
-              </a:solidFill>
-            </a:ln>
-          </p:spPr>
-          <p:style>
-            <a:lnRef idx="2">
-              <a:schemeClr val="accent1">
-                <a:shade val="50000"/>
-              </a:schemeClr>
-            </a:lnRef>
-            <a:fillRef idx="1">
-              <a:schemeClr val="accent1"/>
-            </a:fillRef>
-            <a:effectRef idx="0">
-              <a:schemeClr val="accent1"/>
-            </a:effectRef>
-            <a:fontRef idx="minor">
-              <a:schemeClr val="lt1"/>
-            </a:fontRef>
-          </p:style>
-          <p:txBody>
-            <a:bodyPr rtlCol="0" anchor="ctr"/>
-            <a:lstStyle/>
-            <a:p>
-              <a:pPr algn="ctr"/>
-              <a:endParaRPr lang="ko-KR" altLang="en-US" sz="1600" dirty="0">
-                <a:latin typeface="JejuGothic" panose="02000300000000000000" pitchFamily="2" charset="-127"/>
-                <a:ea typeface="JejuGothic" panose="02000300000000000000" pitchFamily="2" charset="-127"/>
-              </a:endParaRPr>
-            </a:p>
-          </p:txBody>
-        </p:sp>
         <p:sp>
           <p:nvSpPr>
             <p:cNvPr id="23" name="TextBox 22">
@@ -5366,6 +5372,27 @@
             </a:prstGeom>
           </p:spPr>
         </p:pic>
+      </p:grpSp>
+      <p:grpSp>
+        <p:nvGrpSpPr>
+          <p:cNvPr id="8" name="그룹 7">
+            <a:extLst>
+              <a:ext uri="{FF2B5EF4-FFF2-40B4-BE49-F238E27FC236}">
+                <a16:creationId xmlns:a16="http://schemas.microsoft.com/office/drawing/2014/main" id="{A9DBFF13-9966-121C-3039-B6A30F620D8E}"/>
+              </a:ext>
+            </a:extLst>
+          </p:cNvPr>
+          <p:cNvGrpSpPr/>
+          <p:nvPr/>
+        </p:nvGrpSpPr>
+        <p:grpSpPr>
+          <a:xfrm>
+            <a:off x="571707" y="1265041"/>
+            <a:ext cx="1431396" cy="169277"/>
+            <a:chOff x="571707" y="1353318"/>
+            <a:chExt cx="1431396" cy="169277"/>
+          </a:xfrm>
+        </p:grpSpPr>
         <p:sp>
           <p:nvSpPr>
             <p:cNvPr id="25" name="TextBox 24">
@@ -5411,6 +5438,74 @@
             </a:p>
           </p:txBody>
         </p:sp>
+        <p:pic>
+          <p:nvPicPr>
+            <p:cNvPr id="34" name="Picture 4">
+              <a:extLst>
+                <a:ext uri="{FF2B5EF4-FFF2-40B4-BE49-F238E27FC236}">
+                  <a16:creationId xmlns:a16="http://schemas.microsoft.com/office/drawing/2014/main" id="{36498A1A-98AE-455F-B867-6A0214C57ACF}"/>
+                </a:ext>
+              </a:extLst>
+            </p:cNvPr>
+            <p:cNvPicPr>
+              <a:picLocks noChangeAspect="1" noChangeArrowheads="1"/>
+            </p:cNvPicPr>
+            <p:nvPr/>
+          </p:nvPicPr>
+          <p:blipFill>
+            <a:blip r:embed="rId5">
+              <a:extLst>
+                <a:ext uri="{28A0092B-C50C-407E-A947-70E740481C1C}">
+                  <a14:useLocalDpi xmlns:a14="http://schemas.microsoft.com/office/drawing/2010/main" val="0"/>
+                </a:ext>
+              </a:extLst>
+            </a:blip>
+            <a:srcRect/>
+            <a:stretch>
+              <a:fillRect/>
+            </a:stretch>
+          </p:blipFill>
+          <p:spPr bwMode="auto">
+            <a:xfrm>
+              <a:off x="571707" y="1376233"/>
+              <a:ext cx="584518" cy="118573"/>
+            </a:xfrm>
+            <a:prstGeom prst="rect">
+              <a:avLst/>
+            </a:prstGeom>
+            <a:noFill/>
+            <a:extLst>
+              <a:ext uri="{909E8E84-426E-40DD-AFC4-6F175D3DCCD1}">
+                <a14:hiddenFill xmlns:a14="http://schemas.microsoft.com/office/drawing/2010/main">
+                  <a:solidFill>
+                    <a:srgbClr val="FFFFFF"/>
+                  </a:solidFill>
+                </a14:hiddenFill>
+              </a:ext>
+            </a:extLst>
+          </p:spPr>
+        </p:pic>
+      </p:grpSp>
+      <p:grpSp>
+        <p:nvGrpSpPr>
+          <p:cNvPr id="9" name="그룹 8">
+            <a:extLst>
+              <a:ext uri="{FF2B5EF4-FFF2-40B4-BE49-F238E27FC236}">
+                <a16:creationId xmlns:a16="http://schemas.microsoft.com/office/drawing/2014/main" id="{112DA3F9-EEBB-06D4-E3AD-3C78DFDF3AC8}"/>
+              </a:ext>
+            </a:extLst>
+          </p:cNvPr>
+          <p:cNvGrpSpPr/>
+          <p:nvPr/>
+        </p:nvGrpSpPr>
+        <p:grpSpPr>
+          <a:xfrm>
+            <a:off x="820820" y="1442232"/>
+            <a:ext cx="1182280" cy="169277"/>
+            <a:chOff x="820820" y="1546064"/>
+            <a:chExt cx="1182280" cy="169277"/>
+          </a:xfrm>
+        </p:grpSpPr>
         <p:sp>
           <p:nvSpPr>
             <p:cNvPr id="26" name="TextBox 25">
@@ -5463,6 +5558,194 @@
             </a:p>
           </p:txBody>
         </p:sp>
+        <p:pic>
+          <p:nvPicPr>
+            <p:cNvPr id="35" name="Picture 10">
+              <a:extLst>
+                <a:ext uri="{FF2B5EF4-FFF2-40B4-BE49-F238E27FC236}">
+                  <a16:creationId xmlns:a16="http://schemas.microsoft.com/office/drawing/2014/main" id="{0C9D91D3-AAD4-4C46-99CC-AD463C8C5C04}"/>
+                </a:ext>
+              </a:extLst>
+            </p:cNvPr>
+            <p:cNvPicPr>
+              <a:picLocks noChangeAspect="1" noChangeArrowheads="1"/>
+            </p:cNvPicPr>
+            <p:nvPr/>
+          </p:nvPicPr>
+          <p:blipFill>
+            <a:blip r:embed="rId6">
+              <a:extLst>
+                <a:ext uri="{28A0092B-C50C-407E-A947-70E740481C1C}">
+                  <a14:useLocalDpi xmlns:a14="http://schemas.microsoft.com/office/drawing/2010/main" val="0"/>
+                </a:ext>
+              </a:extLst>
+            </a:blip>
+            <a:srcRect/>
+            <a:stretch>
+              <a:fillRect/>
+            </a:stretch>
+          </p:blipFill>
+          <p:spPr bwMode="auto">
+            <a:xfrm>
+              <a:off x="820820" y="1582067"/>
+              <a:ext cx="331082" cy="109929"/>
+            </a:xfrm>
+            <a:prstGeom prst="rect">
+              <a:avLst/>
+            </a:prstGeom>
+            <a:noFill/>
+            <a:extLst>
+              <a:ext uri="{909E8E84-426E-40DD-AFC4-6F175D3DCCD1}">
+                <a14:hiddenFill xmlns:a14="http://schemas.microsoft.com/office/drawing/2010/main">
+                  <a:solidFill>
+                    <a:srgbClr val="FFFFFF"/>
+                  </a:solidFill>
+                </a14:hiddenFill>
+              </a:ext>
+            </a:extLst>
+          </p:spPr>
+        </p:pic>
+      </p:grpSp>
+      <p:grpSp>
+        <p:nvGrpSpPr>
+          <p:cNvPr id="14" name="그룹 13">
+            <a:extLst>
+              <a:ext uri="{FF2B5EF4-FFF2-40B4-BE49-F238E27FC236}">
+                <a16:creationId xmlns:a16="http://schemas.microsoft.com/office/drawing/2014/main" id="{FA3AB94A-65F6-F3FD-F861-EED24A7E6C85}"/>
+              </a:ext>
+            </a:extLst>
+          </p:cNvPr>
+          <p:cNvGrpSpPr/>
+          <p:nvPr/>
+        </p:nvGrpSpPr>
+        <p:grpSpPr>
+          <a:xfrm>
+            <a:off x="802943" y="2150996"/>
+            <a:ext cx="1200156" cy="169277"/>
+            <a:chOff x="802943" y="2317048"/>
+            <a:chExt cx="1200156" cy="169277"/>
+          </a:xfrm>
+        </p:grpSpPr>
+        <p:sp>
+          <p:nvSpPr>
+            <p:cNvPr id="32" name="TextBox 31">
+              <a:extLst>
+                <a:ext uri="{FF2B5EF4-FFF2-40B4-BE49-F238E27FC236}">
+                  <a16:creationId xmlns:a16="http://schemas.microsoft.com/office/drawing/2014/main" id="{E97A66A2-EC3E-49C9-BE11-227A8E6AC36A}"/>
+                </a:ext>
+              </a:extLst>
+            </p:cNvPr>
+            <p:cNvSpPr txBox="1"/>
+            <p:nvPr/>
+          </p:nvSpPr>
+          <p:spPr>
+            <a:xfrm>
+              <a:off x="1187957" y="2317048"/>
+              <a:ext cx="815142" cy="169277"/>
+            </a:xfrm>
+            <a:prstGeom prst="rect">
+              <a:avLst/>
+            </a:prstGeom>
+            <a:noFill/>
+          </p:spPr>
+          <p:txBody>
+            <a:bodyPr wrap="square" rtlCol="0">
+              <a:spAutoFit/>
+            </a:bodyPr>
+            <a:lstStyle/>
+            <a:p>
+              <a:r>
+                <a:rPr lang="ko-KR" altLang="en-US" sz="500" dirty="0">
+                  <a:latin typeface="JejuGothic" panose="02000300000000000000" pitchFamily="2" charset="-127"/>
+                  <a:ea typeface="JejuGothic" panose="02000300000000000000" pitchFamily="2" charset="-127"/>
+                </a:rPr>
+                <a:t>삼성전자</a:t>
+              </a:r>
+              <a:r>
+                <a:rPr lang="en-US" altLang="ko-KR" sz="500" dirty="0">
+                  <a:latin typeface="JejuGothic" panose="02000300000000000000" pitchFamily="2" charset="-127"/>
+                  <a:ea typeface="JejuGothic" panose="02000300000000000000" pitchFamily="2" charset="-127"/>
+                </a:rPr>
+                <a:t> </a:t>
+              </a:r>
+              <a:r>
+                <a:rPr lang="ko-KR" altLang="en-US" sz="500" dirty="0">
+                  <a:latin typeface="JejuGothic" panose="02000300000000000000" pitchFamily="2" charset="-127"/>
+                  <a:ea typeface="JejuGothic" panose="02000300000000000000" pitchFamily="2" charset="-127"/>
+                </a:rPr>
+                <a:t>김성호</a:t>
+              </a:r>
+            </a:p>
+          </p:txBody>
+        </p:sp>
+        <p:pic>
+          <p:nvPicPr>
+            <p:cNvPr id="36" name="Picture 10">
+              <a:extLst>
+                <a:ext uri="{FF2B5EF4-FFF2-40B4-BE49-F238E27FC236}">
+                  <a16:creationId xmlns:a16="http://schemas.microsoft.com/office/drawing/2014/main" id="{1405680C-FA8E-4FD9-BCF6-D1AA401E3D54}"/>
+                </a:ext>
+              </a:extLst>
+            </p:cNvPr>
+            <p:cNvPicPr>
+              <a:picLocks noChangeAspect="1" noChangeArrowheads="1"/>
+            </p:cNvPicPr>
+            <p:nvPr/>
+          </p:nvPicPr>
+          <p:blipFill>
+            <a:blip r:embed="rId6">
+              <a:extLst>
+                <a:ext uri="{28A0092B-C50C-407E-A947-70E740481C1C}">
+                  <a14:useLocalDpi xmlns:a14="http://schemas.microsoft.com/office/drawing/2010/main" val="0"/>
+                </a:ext>
+              </a:extLst>
+            </a:blip>
+            <a:srcRect/>
+            <a:stretch>
+              <a:fillRect/>
+            </a:stretch>
+          </p:blipFill>
+          <p:spPr bwMode="auto">
+            <a:xfrm>
+              <a:off x="802943" y="2344405"/>
+              <a:ext cx="348959" cy="115865"/>
+            </a:xfrm>
+            <a:prstGeom prst="rect">
+              <a:avLst/>
+            </a:prstGeom>
+            <a:noFill/>
+            <a:extLst>
+              <a:ext uri="{909E8E84-426E-40DD-AFC4-6F175D3DCCD1}">
+                <a14:hiddenFill xmlns:a14="http://schemas.microsoft.com/office/drawing/2010/main">
+                  <a:solidFill>
+                    <a:srgbClr val="FFFFFF"/>
+                  </a:solidFill>
+                </a14:hiddenFill>
+              </a:ext>
+            </a:extLst>
+          </p:spPr>
+        </p:pic>
+      </p:grpSp>
+      <p:grpSp>
+        <p:nvGrpSpPr>
+          <p:cNvPr id="11" name="그룹 10">
+            <a:extLst>
+              <a:ext uri="{FF2B5EF4-FFF2-40B4-BE49-F238E27FC236}">
+                <a16:creationId xmlns:a16="http://schemas.microsoft.com/office/drawing/2014/main" id="{9A22F020-55F5-3A6A-7FF2-0C95DB9EBBFC}"/>
+              </a:ext>
+            </a:extLst>
+          </p:cNvPr>
+          <p:cNvGrpSpPr/>
+          <p:nvPr/>
+        </p:nvGrpSpPr>
+        <p:grpSpPr>
+          <a:xfrm>
+            <a:off x="1015235" y="1619423"/>
+            <a:ext cx="987864" cy="169277"/>
+            <a:chOff x="1015235" y="1738810"/>
+            <a:chExt cx="987864" cy="169277"/>
+          </a:xfrm>
+        </p:grpSpPr>
         <p:sp>
           <p:nvSpPr>
             <p:cNvPr id="27" name="TextBox 26">
@@ -5522,6 +5805,62 @@
             </a:p>
           </p:txBody>
         </p:sp>
+        <p:pic>
+          <p:nvPicPr>
+            <p:cNvPr id="37" name="그림 36" descr="표지판, 그리기, 시계이(가) 표시된 사진&#10;&#10;자동 생성된 설명">
+              <a:extLst>
+                <a:ext uri="{FF2B5EF4-FFF2-40B4-BE49-F238E27FC236}">
+                  <a16:creationId xmlns:a16="http://schemas.microsoft.com/office/drawing/2014/main" id="{A72B159A-7AB0-434B-B575-1A9CC7CF421C}"/>
+                </a:ext>
+              </a:extLst>
+            </p:cNvPr>
+            <p:cNvPicPr>
+              <a:picLocks noChangeAspect="1"/>
+            </p:cNvPicPr>
+            <p:nvPr/>
+          </p:nvPicPr>
+          <p:blipFill rotWithShape="1">
+            <a:blip r:embed="rId7">
+              <a:extLst>
+                <a:ext uri="{28A0092B-C50C-407E-A947-70E740481C1C}">
+                  <a14:useLocalDpi xmlns:a14="http://schemas.microsoft.com/office/drawing/2010/main" val="0"/>
+                </a:ext>
+              </a:extLst>
+            </a:blip>
+            <a:srcRect r="71957"/>
+            <a:stretch/>
+          </p:blipFill>
+          <p:spPr>
+            <a:xfrm>
+              <a:off x="1015235" y="1755669"/>
+              <a:ext cx="138553" cy="142894"/>
+            </a:xfrm>
+            <a:prstGeom prst="rect">
+              <a:avLst/>
+            </a:prstGeom>
+          </p:spPr>
+        </p:pic>
+      </p:grpSp>
+      <p:grpSp>
+        <p:nvGrpSpPr>
+          <p:cNvPr id="12" name="그룹 11">
+            <a:extLst>
+              <a:ext uri="{FF2B5EF4-FFF2-40B4-BE49-F238E27FC236}">
+                <a16:creationId xmlns:a16="http://schemas.microsoft.com/office/drawing/2014/main" id="{3C71509D-437B-D65E-1A17-D8DFBF120A6C}"/>
+              </a:ext>
+            </a:extLst>
+          </p:cNvPr>
+          <p:cNvGrpSpPr/>
+          <p:nvPr/>
+        </p:nvGrpSpPr>
+        <p:grpSpPr>
+          <a:xfrm>
+            <a:off x="1009034" y="1796614"/>
+            <a:ext cx="994065" cy="169277"/>
+            <a:chOff x="1009034" y="1931556"/>
+            <a:chExt cx="994065" cy="169277"/>
+          </a:xfrm>
+        </p:grpSpPr>
         <p:sp>
           <p:nvSpPr>
             <p:cNvPr id="29" name="TextBox 28">
@@ -5581,6 +5920,62 @@
             </a:p>
           </p:txBody>
         </p:sp>
+        <p:pic>
+          <p:nvPicPr>
+            <p:cNvPr id="38" name="그림 37" descr="표지판, 그리기, 시계이(가) 표시된 사진&#10;&#10;자동 생성된 설명">
+              <a:extLst>
+                <a:ext uri="{FF2B5EF4-FFF2-40B4-BE49-F238E27FC236}">
+                  <a16:creationId xmlns:a16="http://schemas.microsoft.com/office/drawing/2014/main" id="{9E31B6AC-8D1E-4B0E-A6F8-901DAAE8E650}"/>
+                </a:ext>
+              </a:extLst>
+            </p:cNvPr>
+            <p:cNvPicPr>
+              <a:picLocks noChangeAspect="1"/>
+            </p:cNvPicPr>
+            <p:nvPr/>
+          </p:nvPicPr>
+          <p:blipFill rotWithShape="1">
+            <a:blip r:embed="rId7">
+              <a:extLst>
+                <a:ext uri="{28A0092B-C50C-407E-A947-70E740481C1C}">
+                  <a14:useLocalDpi xmlns:a14="http://schemas.microsoft.com/office/drawing/2010/main" val="0"/>
+                </a:ext>
+              </a:extLst>
+            </a:blip>
+            <a:srcRect r="71957"/>
+            <a:stretch/>
+          </p:blipFill>
+          <p:spPr>
+            <a:xfrm>
+              <a:off x="1009034" y="1948613"/>
+              <a:ext cx="148175" cy="142894"/>
+            </a:xfrm>
+            <a:prstGeom prst="rect">
+              <a:avLst/>
+            </a:prstGeom>
+          </p:spPr>
+        </p:pic>
+      </p:grpSp>
+      <p:grpSp>
+        <p:nvGrpSpPr>
+          <p:cNvPr id="13" name="그룹 12">
+            <a:extLst>
+              <a:ext uri="{FF2B5EF4-FFF2-40B4-BE49-F238E27FC236}">
+                <a16:creationId xmlns:a16="http://schemas.microsoft.com/office/drawing/2014/main" id="{626248A0-3139-C24D-E8CA-878EEFD3D571}"/>
+              </a:ext>
+            </a:extLst>
+          </p:cNvPr>
+          <p:cNvGrpSpPr/>
+          <p:nvPr/>
+        </p:nvGrpSpPr>
+        <p:grpSpPr>
+          <a:xfrm>
+            <a:off x="1009034" y="1973805"/>
+            <a:ext cx="994065" cy="169277"/>
+            <a:chOff x="1009034" y="2124302"/>
+            <a:chExt cx="994065" cy="169277"/>
+          </a:xfrm>
+        </p:grpSpPr>
         <p:sp>
           <p:nvSpPr>
             <p:cNvPr id="31" name="TextBox 30">
@@ -5640,58 +6035,62 @@
             </a:p>
           </p:txBody>
         </p:sp>
-        <p:sp>
-          <p:nvSpPr>
-            <p:cNvPr id="32" name="TextBox 31">
+        <p:pic>
+          <p:nvPicPr>
+            <p:cNvPr id="39" name="그림 38" descr="표지판, 그리기, 시계이(가) 표시된 사진&#10;&#10;자동 생성된 설명">
               <a:extLst>
                 <a:ext uri="{FF2B5EF4-FFF2-40B4-BE49-F238E27FC236}">
-                  <a16:creationId xmlns:a16="http://schemas.microsoft.com/office/drawing/2014/main" id="{E97A66A2-EC3E-49C9-BE11-227A8E6AC36A}"/>
+                  <a16:creationId xmlns:a16="http://schemas.microsoft.com/office/drawing/2014/main" id="{F4B01B3C-B808-4A8E-A46A-8C4160AD677A}"/>
                 </a:ext>
               </a:extLst>
             </p:cNvPr>
-            <p:cNvSpPr txBox="1"/>
+            <p:cNvPicPr>
+              <a:picLocks noChangeAspect="1"/>
+            </p:cNvPicPr>
             <p:nvPr/>
-          </p:nvSpPr>
+          </p:nvPicPr>
+          <p:blipFill rotWithShape="1">
+            <a:blip r:embed="rId7">
+              <a:extLst>
+                <a:ext uri="{28A0092B-C50C-407E-A947-70E740481C1C}">
+                  <a14:useLocalDpi xmlns:a14="http://schemas.microsoft.com/office/drawing/2010/main" val="0"/>
+                </a:ext>
+              </a:extLst>
+            </a:blip>
+            <a:srcRect r="71957"/>
+            <a:stretch/>
+          </p:blipFill>
           <p:spPr>
             <a:xfrm>
-              <a:off x="1187957" y="2317048"/>
-              <a:ext cx="815142" cy="169277"/>
+              <a:off x="1009034" y="2144244"/>
+              <a:ext cx="148175" cy="142894"/>
             </a:xfrm>
             <a:prstGeom prst="rect">
               <a:avLst/>
             </a:prstGeom>
-            <a:noFill/>
           </p:spPr>
-          <p:txBody>
-            <a:bodyPr wrap="square" rtlCol="0">
-              <a:spAutoFit/>
-            </a:bodyPr>
-            <a:lstStyle/>
-            <a:p>
-              <a:r>
-                <a:rPr lang="ko-KR" altLang="en-US" sz="500" dirty="0">
-                  <a:latin typeface="JejuGothic" panose="02000300000000000000" pitchFamily="2" charset="-127"/>
-                  <a:ea typeface="JejuGothic" panose="02000300000000000000" pitchFamily="2" charset="-127"/>
-                </a:rPr>
-                <a:t>삼성전자</a:t>
-              </a:r>
-              <a:r>
-                <a:rPr lang="en-US" altLang="ko-KR" sz="500" dirty="0">
-                  <a:latin typeface="JejuGothic" panose="02000300000000000000" pitchFamily="2" charset="-127"/>
-                  <a:ea typeface="JejuGothic" panose="02000300000000000000" pitchFamily="2" charset="-127"/>
-                </a:rPr>
-                <a:t> </a:t>
-              </a:r>
-              <a:r>
-                <a:rPr lang="ko-KR" altLang="en-US" sz="500" dirty="0">
-                  <a:latin typeface="JejuGothic" panose="02000300000000000000" pitchFamily="2" charset="-127"/>
-                  <a:ea typeface="JejuGothic" panose="02000300000000000000" pitchFamily="2" charset="-127"/>
-                </a:rPr>
-                <a:t>김성호</a:t>
-              </a:r>
-            </a:p>
-          </p:txBody>
-        </p:sp>
+        </p:pic>
+      </p:grpSp>
+      <p:grpSp>
+        <p:nvGrpSpPr>
+          <p:cNvPr id="16" name="그룹 15">
+            <a:extLst>
+              <a:ext uri="{FF2B5EF4-FFF2-40B4-BE49-F238E27FC236}">
+                <a16:creationId xmlns:a16="http://schemas.microsoft.com/office/drawing/2014/main" id="{434449A7-E031-9A95-E508-66EB3F80CD43}"/>
+              </a:ext>
+            </a:extLst>
+          </p:cNvPr>
+          <p:cNvGrpSpPr/>
+          <p:nvPr/>
+        </p:nvGrpSpPr>
+        <p:grpSpPr>
+          <a:xfrm>
+            <a:off x="838513" y="2404348"/>
+            <a:ext cx="1164586" cy="169277"/>
+            <a:chOff x="838513" y="2509794"/>
+            <a:chExt cx="1164586" cy="169277"/>
+          </a:xfrm>
+        </p:grpSpPr>
         <p:sp>
           <p:nvSpPr>
             <p:cNvPr id="33" name="TextBox 32">
@@ -5739,252 +6138,6 @@
         </p:sp>
         <p:pic>
           <p:nvPicPr>
-            <p:cNvPr id="34" name="Picture 4">
-              <a:extLst>
-                <a:ext uri="{FF2B5EF4-FFF2-40B4-BE49-F238E27FC236}">
-                  <a16:creationId xmlns:a16="http://schemas.microsoft.com/office/drawing/2014/main" id="{36498A1A-98AE-455F-B867-6A0214C57ACF}"/>
-                </a:ext>
-              </a:extLst>
-            </p:cNvPr>
-            <p:cNvPicPr>
-              <a:picLocks noChangeAspect="1" noChangeArrowheads="1"/>
-            </p:cNvPicPr>
-            <p:nvPr/>
-          </p:nvPicPr>
-          <p:blipFill>
-            <a:blip r:embed="rId5">
-              <a:extLst>
-                <a:ext uri="{28A0092B-C50C-407E-A947-70E740481C1C}">
-                  <a14:useLocalDpi xmlns:a14="http://schemas.microsoft.com/office/drawing/2010/main" val="0"/>
-                </a:ext>
-              </a:extLst>
-            </a:blip>
-            <a:srcRect/>
-            <a:stretch>
-              <a:fillRect/>
-            </a:stretch>
-          </p:blipFill>
-          <p:spPr bwMode="auto">
-            <a:xfrm>
-              <a:off x="571707" y="1376233"/>
-              <a:ext cx="584518" cy="118573"/>
-            </a:xfrm>
-            <a:prstGeom prst="rect">
-              <a:avLst/>
-            </a:prstGeom>
-            <a:noFill/>
-            <a:extLst>
-              <a:ext uri="{909E8E84-426E-40DD-AFC4-6F175D3DCCD1}">
-                <a14:hiddenFill xmlns:a14="http://schemas.microsoft.com/office/drawing/2010/main">
-                  <a:solidFill>
-                    <a:srgbClr val="FFFFFF"/>
-                  </a:solidFill>
-                </a14:hiddenFill>
-              </a:ext>
-            </a:extLst>
-          </p:spPr>
-        </p:pic>
-        <p:pic>
-          <p:nvPicPr>
-            <p:cNvPr id="35" name="Picture 10">
-              <a:extLst>
-                <a:ext uri="{FF2B5EF4-FFF2-40B4-BE49-F238E27FC236}">
-                  <a16:creationId xmlns:a16="http://schemas.microsoft.com/office/drawing/2014/main" id="{0C9D91D3-AAD4-4C46-99CC-AD463C8C5C04}"/>
-                </a:ext>
-              </a:extLst>
-            </p:cNvPr>
-            <p:cNvPicPr>
-              <a:picLocks noChangeAspect="1" noChangeArrowheads="1"/>
-            </p:cNvPicPr>
-            <p:nvPr/>
-          </p:nvPicPr>
-          <p:blipFill>
-            <a:blip r:embed="rId6">
-              <a:extLst>
-                <a:ext uri="{28A0092B-C50C-407E-A947-70E740481C1C}">
-                  <a14:useLocalDpi xmlns:a14="http://schemas.microsoft.com/office/drawing/2010/main" val="0"/>
-                </a:ext>
-              </a:extLst>
-            </a:blip>
-            <a:srcRect/>
-            <a:stretch>
-              <a:fillRect/>
-            </a:stretch>
-          </p:blipFill>
-          <p:spPr bwMode="auto">
-            <a:xfrm>
-              <a:off x="820820" y="1582067"/>
-              <a:ext cx="331082" cy="109929"/>
-            </a:xfrm>
-            <a:prstGeom prst="rect">
-              <a:avLst/>
-            </a:prstGeom>
-            <a:noFill/>
-            <a:extLst>
-              <a:ext uri="{909E8E84-426E-40DD-AFC4-6F175D3DCCD1}">
-                <a14:hiddenFill xmlns:a14="http://schemas.microsoft.com/office/drawing/2010/main">
-                  <a:solidFill>
-                    <a:srgbClr val="FFFFFF"/>
-                  </a:solidFill>
-                </a14:hiddenFill>
-              </a:ext>
-            </a:extLst>
-          </p:spPr>
-        </p:pic>
-        <p:pic>
-          <p:nvPicPr>
-            <p:cNvPr id="36" name="Picture 10">
-              <a:extLst>
-                <a:ext uri="{FF2B5EF4-FFF2-40B4-BE49-F238E27FC236}">
-                  <a16:creationId xmlns:a16="http://schemas.microsoft.com/office/drawing/2014/main" id="{1405680C-FA8E-4FD9-BCF6-D1AA401E3D54}"/>
-                </a:ext>
-              </a:extLst>
-            </p:cNvPr>
-            <p:cNvPicPr>
-              <a:picLocks noChangeAspect="1" noChangeArrowheads="1"/>
-            </p:cNvPicPr>
-            <p:nvPr/>
-          </p:nvPicPr>
-          <p:blipFill>
-            <a:blip r:embed="rId6">
-              <a:extLst>
-                <a:ext uri="{28A0092B-C50C-407E-A947-70E740481C1C}">
-                  <a14:useLocalDpi xmlns:a14="http://schemas.microsoft.com/office/drawing/2010/main" val="0"/>
-                </a:ext>
-              </a:extLst>
-            </a:blip>
-            <a:srcRect/>
-            <a:stretch>
-              <a:fillRect/>
-            </a:stretch>
-          </p:blipFill>
-          <p:spPr bwMode="auto">
-            <a:xfrm>
-              <a:off x="802943" y="2344405"/>
-              <a:ext cx="348959" cy="115865"/>
-            </a:xfrm>
-            <a:prstGeom prst="rect">
-              <a:avLst/>
-            </a:prstGeom>
-            <a:noFill/>
-            <a:extLst>
-              <a:ext uri="{909E8E84-426E-40DD-AFC4-6F175D3DCCD1}">
-                <a14:hiddenFill xmlns:a14="http://schemas.microsoft.com/office/drawing/2010/main">
-                  <a:solidFill>
-                    <a:srgbClr val="FFFFFF"/>
-                  </a:solidFill>
-                </a14:hiddenFill>
-              </a:ext>
-            </a:extLst>
-          </p:spPr>
-        </p:pic>
-        <p:pic>
-          <p:nvPicPr>
-            <p:cNvPr id="37" name="그림 36" descr="표지판, 그리기, 시계이(가) 표시된 사진&#10;&#10;자동 생성된 설명">
-              <a:extLst>
-                <a:ext uri="{FF2B5EF4-FFF2-40B4-BE49-F238E27FC236}">
-                  <a16:creationId xmlns:a16="http://schemas.microsoft.com/office/drawing/2014/main" id="{A72B159A-7AB0-434B-B575-1A9CC7CF421C}"/>
-                </a:ext>
-              </a:extLst>
-            </p:cNvPr>
-            <p:cNvPicPr>
-              <a:picLocks noChangeAspect="1"/>
-            </p:cNvPicPr>
-            <p:nvPr/>
-          </p:nvPicPr>
-          <p:blipFill rotWithShape="1">
-            <a:blip r:embed="rId7">
-              <a:extLst>
-                <a:ext uri="{28A0092B-C50C-407E-A947-70E740481C1C}">
-                  <a14:useLocalDpi xmlns:a14="http://schemas.microsoft.com/office/drawing/2010/main" val="0"/>
-                </a:ext>
-              </a:extLst>
-            </a:blip>
-            <a:srcRect r="71957"/>
-            <a:stretch/>
-          </p:blipFill>
-          <p:spPr>
-            <a:xfrm>
-              <a:off x="1015235" y="1755669"/>
-              <a:ext cx="138553" cy="142894"/>
-            </a:xfrm>
-            <a:prstGeom prst="rect">
-              <a:avLst/>
-            </a:prstGeom>
-          </p:spPr>
-        </p:pic>
-        <p:pic>
-          <p:nvPicPr>
-            <p:cNvPr id="38" name="그림 37" descr="표지판, 그리기, 시계이(가) 표시된 사진&#10;&#10;자동 생성된 설명">
-              <a:extLst>
-                <a:ext uri="{FF2B5EF4-FFF2-40B4-BE49-F238E27FC236}">
-                  <a16:creationId xmlns:a16="http://schemas.microsoft.com/office/drawing/2014/main" id="{9E31B6AC-8D1E-4B0E-A6F8-901DAAE8E650}"/>
-                </a:ext>
-              </a:extLst>
-            </p:cNvPr>
-            <p:cNvPicPr>
-              <a:picLocks noChangeAspect="1"/>
-            </p:cNvPicPr>
-            <p:nvPr/>
-          </p:nvPicPr>
-          <p:blipFill rotWithShape="1">
-            <a:blip r:embed="rId7">
-              <a:extLst>
-                <a:ext uri="{28A0092B-C50C-407E-A947-70E740481C1C}">
-                  <a14:useLocalDpi xmlns:a14="http://schemas.microsoft.com/office/drawing/2010/main" val="0"/>
-                </a:ext>
-              </a:extLst>
-            </a:blip>
-            <a:srcRect r="71957"/>
-            <a:stretch/>
-          </p:blipFill>
-          <p:spPr>
-            <a:xfrm>
-              <a:off x="1009034" y="1948613"/>
-              <a:ext cx="148175" cy="142894"/>
-            </a:xfrm>
-            <a:prstGeom prst="rect">
-              <a:avLst/>
-            </a:prstGeom>
-          </p:spPr>
-        </p:pic>
-        <p:pic>
-          <p:nvPicPr>
-            <p:cNvPr id="39" name="그림 38" descr="표지판, 그리기, 시계이(가) 표시된 사진&#10;&#10;자동 생성된 설명">
-              <a:extLst>
-                <a:ext uri="{FF2B5EF4-FFF2-40B4-BE49-F238E27FC236}">
-                  <a16:creationId xmlns:a16="http://schemas.microsoft.com/office/drawing/2014/main" id="{F4B01B3C-B808-4A8E-A46A-8C4160AD677A}"/>
-                </a:ext>
-              </a:extLst>
-            </p:cNvPr>
-            <p:cNvPicPr>
-              <a:picLocks noChangeAspect="1"/>
-            </p:cNvPicPr>
-            <p:nvPr/>
-          </p:nvPicPr>
-          <p:blipFill rotWithShape="1">
-            <a:blip r:embed="rId7">
-              <a:extLst>
-                <a:ext uri="{28A0092B-C50C-407E-A947-70E740481C1C}">
-                  <a14:useLocalDpi xmlns:a14="http://schemas.microsoft.com/office/drawing/2010/main" val="0"/>
-                </a:ext>
-              </a:extLst>
-            </a:blip>
-            <a:srcRect r="71957"/>
-            <a:stretch/>
-          </p:blipFill>
-          <p:spPr>
-            <a:xfrm>
-              <a:off x="1009034" y="2144244"/>
-              <a:ext cx="148175" cy="142894"/>
-            </a:xfrm>
-            <a:prstGeom prst="rect">
-              <a:avLst/>
-            </a:prstGeom>
-          </p:spPr>
-        </p:pic>
-        <p:pic>
-          <p:nvPicPr>
             <p:cNvPr id="40" name="Picture 12" descr="kakao">
               <a:extLst>
                 <a:ext uri="{FF2B5EF4-FFF2-40B4-BE49-F238E27FC236}">
@@ -6028,6 +6181,27 @@
             </a:extLst>
           </p:spPr>
         </p:pic>
+      </p:grpSp>
+      <p:grpSp>
+        <p:nvGrpSpPr>
+          <p:cNvPr id="17" name="그룹 16">
+            <a:extLst>
+              <a:ext uri="{FF2B5EF4-FFF2-40B4-BE49-F238E27FC236}">
+                <a16:creationId xmlns:a16="http://schemas.microsoft.com/office/drawing/2014/main" id="{E848A70B-E3E0-C65E-954D-A5E2FF38B4BE}"/>
+              </a:ext>
+            </a:extLst>
+          </p:cNvPr>
+          <p:cNvGrpSpPr/>
+          <p:nvPr/>
+        </p:nvGrpSpPr>
+        <p:grpSpPr>
+          <a:xfrm>
+            <a:off x="1023747" y="2581539"/>
+            <a:ext cx="982399" cy="169277"/>
+            <a:chOff x="1023747" y="2702425"/>
+            <a:chExt cx="982399" cy="169277"/>
+          </a:xfrm>
+        </p:grpSpPr>
         <p:pic>
           <p:nvPicPr>
             <p:cNvPr id="82" name="그림 81">
@@ -6108,6 +6282,27 @@
             </a:p>
           </p:txBody>
         </p:sp>
+      </p:grpSp>
+      <p:grpSp>
+        <p:nvGrpSpPr>
+          <p:cNvPr id="18" name="그룹 17">
+            <a:extLst>
+              <a:ext uri="{FF2B5EF4-FFF2-40B4-BE49-F238E27FC236}">
+                <a16:creationId xmlns:a16="http://schemas.microsoft.com/office/drawing/2014/main" id="{F54E9BEA-514B-3B2C-6C0E-9FDC96DE955D}"/>
+              </a:ext>
+            </a:extLst>
+          </p:cNvPr>
+          <p:cNvGrpSpPr/>
+          <p:nvPr/>
+        </p:nvGrpSpPr>
+        <p:grpSpPr>
+          <a:xfrm>
+            <a:off x="838513" y="2758730"/>
+            <a:ext cx="1165936" cy="169277"/>
+            <a:chOff x="838513" y="2813348"/>
+            <a:chExt cx="1165936" cy="169277"/>
+          </a:xfrm>
+        </p:grpSpPr>
         <p:sp>
           <p:nvSpPr>
             <p:cNvPr id="85" name="TextBox 84">
@@ -6122,7 +6317,7 @@
           </p:nvSpPr>
           <p:spPr>
             <a:xfrm>
-              <a:off x="1187249" y="2895170"/>
+              <a:off x="1187249" y="2813348"/>
               <a:ext cx="817200" cy="169277"/>
             </a:xfrm>
             <a:prstGeom prst="rect">
@@ -6180,7 +6375,7 @@
           </p:blipFill>
           <p:spPr bwMode="auto">
             <a:xfrm>
-              <a:off x="838513" y="2920608"/>
+              <a:off x="838513" y="2838786"/>
               <a:ext cx="312115" cy="99712"/>
             </a:xfrm>
             <a:prstGeom prst="rect">
@@ -6201,10 +6396,10 @@
       </p:grpSp>
       <p:grpSp>
         <p:nvGrpSpPr>
-          <p:cNvPr id="1106" name="그룹 1105">
-            <a:extLst>
-              <a:ext uri="{FF2B5EF4-FFF2-40B4-BE49-F238E27FC236}">
-                <a16:creationId xmlns:a16="http://schemas.microsoft.com/office/drawing/2014/main" id="{D08DB4EA-20F7-EC34-DC36-50F0B5F23F70}"/>
+          <p:cNvPr id="47" name="그룹 46">
+            <a:extLst>
+              <a:ext uri="{FF2B5EF4-FFF2-40B4-BE49-F238E27FC236}">
+                <a16:creationId xmlns:a16="http://schemas.microsoft.com/office/drawing/2014/main" id="{687D7E6B-B913-6226-5984-664C0018E43F}"/>
               </a:ext>
             </a:extLst>
           </p:cNvPr>
@@ -6213,10 +6408,10 @@
         </p:nvGrpSpPr>
         <p:grpSpPr>
           <a:xfrm>
-            <a:off x="2112894" y="1160572"/>
-            <a:ext cx="1357376" cy="1903875"/>
-            <a:chOff x="2112894" y="1160572"/>
-            <a:chExt cx="1357376" cy="1903875"/>
+            <a:off x="698989" y="2935926"/>
+            <a:ext cx="1305460" cy="169277"/>
+            <a:chOff x="2161764" y="1160572"/>
+            <a:chExt cx="1305460" cy="169277"/>
           </a:xfrm>
         </p:grpSpPr>
         <p:pic>
@@ -6248,149 +6443,6 @@
             <a:xfrm>
               <a:off x="2161764" y="1200621"/>
               <a:ext cx="465975" cy="88986"/>
-            </a:xfrm>
-            <a:prstGeom prst="rect">
-              <a:avLst/>
-            </a:prstGeom>
-          </p:spPr>
-        </p:pic>
-        <p:pic>
-          <p:nvPicPr>
-            <p:cNvPr id="84" name="그림 83">
-              <a:extLst>
-                <a:ext uri="{FF2B5EF4-FFF2-40B4-BE49-F238E27FC236}">
-                  <a16:creationId xmlns:a16="http://schemas.microsoft.com/office/drawing/2014/main" id="{15444870-8857-4C7C-B83D-45D83640DDEB}"/>
-                </a:ext>
-              </a:extLst>
-            </p:cNvPr>
-            <p:cNvPicPr>
-              <a:picLocks noChangeAspect="1"/>
-            </p:cNvPicPr>
-            <p:nvPr/>
-          </p:nvPicPr>
-          <p:blipFill rotWithShape="1">
-            <a:blip r:embed="rId9">
-              <a:extLst>
-                <a:ext uri="{28A0092B-C50C-407E-A947-70E740481C1C}">
-                  <a14:useLocalDpi xmlns:a14="http://schemas.microsoft.com/office/drawing/2010/main" val="0"/>
-                </a:ext>
-              </a:extLst>
-            </a:blip>
-            <a:srcRect l="13117" t="15493" r="12280" b="11649"/>
-            <a:stretch/>
-          </p:blipFill>
-          <p:spPr>
-            <a:xfrm>
-              <a:off x="2497378" y="1762234"/>
-              <a:ext cx="126881" cy="114382"/>
-            </a:xfrm>
-            <a:prstGeom prst="rect">
-              <a:avLst/>
-            </a:prstGeom>
-          </p:spPr>
-        </p:pic>
-        <p:pic>
-          <p:nvPicPr>
-            <p:cNvPr id="87" name="그림 86">
-              <a:extLst>
-                <a:ext uri="{FF2B5EF4-FFF2-40B4-BE49-F238E27FC236}">
-                  <a16:creationId xmlns:a16="http://schemas.microsoft.com/office/drawing/2014/main" id="{B6B46AF4-0C94-419A-ADD2-90B29F74979A}"/>
-                </a:ext>
-              </a:extLst>
-            </p:cNvPr>
-            <p:cNvPicPr>
-              <a:picLocks noChangeAspect="1"/>
-            </p:cNvPicPr>
-            <p:nvPr/>
-          </p:nvPicPr>
-          <p:blipFill>
-            <a:blip r:embed="rId11">
-              <a:extLst>
-                <a:ext uri="{28A0092B-C50C-407E-A947-70E740481C1C}">
-                  <a14:useLocalDpi xmlns:a14="http://schemas.microsoft.com/office/drawing/2010/main" val="0"/>
-                </a:ext>
-              </a:extLst>
-            </a:blip>
-            <a:stretch>
-              <a:fillRect/>
-            </a:stretch>
-          </p:blipFill>
-          <p:spPr>
-            <a:xfrm>
-              <a:off x="2112894" y="2156970"/>
-              <a:ext cx="510034" cy="107016"/>
-            </a:xfrm>
-            <a:prstGeom prst="rect">
-              <a:avLst/>
-            </a:prstGeom>
-          </p:spPr>
-        </p:pic>
-        <p:pic>
-          <p:nvPicPr>
-            <p:cNvPr id="7" name="그림 6">
-              <a:extLst>
-                <a:ext uri="{FF2B5EF4-FFF2-40B4-BE49-F238E27FC236}">
-                  <a16:creationId xmlns:a16="http://schemas.microsoft.com/office/drawing/2014/main" id="{30B6CE12-F8CB-405B-9F00-C8E68AAB650D}"/>
-                </a:ext>
-              </a:extLst>
-            </p:cNvPr>
-            <p:cNvPicPr>
-              <a:picLocks noChangeAspect="1"/>
-            </p:cNvPicPr>
-            <p:nvPr/>
-          </p:nvPicPr>
-          <p:blipFill>
-            <a:blip r:embed="rId12">
-              <a:extLst>
-                <a:ext uri="{28A0092B-C50C-407E-A947-70E740481C1C}">
-                  <a14:useLocalDpi xmlns:a14="http://schemas.microsoft.com/office/drawing/2010/main" val="0"/>
-                </a:ext>
-              </a:extLst>
-            </a:blip>
-            <a:stretch>
-              <a:fillRect/>
-            </a:stretch>
-          </p:blipFill>
-          <p:spPr>
-            <a:xfrm>
-              <a:off x="2150381" y="1570563"/>
-              <a:ext cx="477153" cy="105991"/>
-            </a:xfrm>
-            <a:prstGeom prst="rect">
-              <a:avLst/>
-            </a:prstGeom>
-          </p:spPr>
-        </p:pic>
-        <p:pic>
-          <p:nvPicPr>
-            <p:cNvPr id="101" name="그림 100">
-              <a:extLst>
-                <a:ext uri="{FF2B5EF4-FFF2-40B4-BE49-F238E27FC236}">
-                  <a16:creationId xmlns:a16="http://schemas.microsoft.com/office/drawing/2014/main" id="{EF57EFA2-6BB5-4B41-BCFC-32884E76BCEE}"/>
-                </a:ext>
-              </a:extLst>
-            </p:cNvPr>
-            <p:cNvPicPr>
-              <a:picLocks noChangeAspect="1"/>
-            </p:cNvPicPr>
-            <p:nvPr/>
-          </p:nvPicPr>
-          <p:blipFill>
-            <a:blip r:embed="rId13">
-              <a:extLst>
-                <a:ext uri="{28A0092B-C50C-407E-A947-70E740481C1C}">
-                  <a14:useLocalDpi xmlns:a14="http://schemas.microsoft.com/office/drawing/2010/main" val="0"/>
-                </a:ext>
-              </a:extLst>
-            </a:blip>
-            <a:stretch>
-              <a:fillRect/>
-            </a:stretch>
-          </p:blipFill>
-          <p:spPr>
-            <a:xfrm>
-              <a:off x="2425948" y="2926200"/>
-              <a:ext cx="196980" cy="107216"/>
             </a:xfrm>
             <a:prstGeom prst="rect">
               <a:avLst/>
@@ -6446,55 +6498,63 @@
             </a:p>
           </p:txBody>
         </p:sp>
-        <p:sp>
-          <p:nvSpPr>
-            <p:cNvPr id="1080" name="TextBox 1079">
+      </p:grpSp>
+      <p:grpSp>
+        <p:nvGrpSpPr>
+          <p:cNvPr id="49" name="그룹 48">
+            <a:extLst>
+              <a:ext uri="{FF2B5EF4-FFF2-40B4-BE49-F238E27FC236}">
+                <a16:creationId xmlns:a16="http://schemas.microsoft.com/office/drawing/2014/main" id="{AE9D53F7-CCC5-EC72-76AD-9897BBCCBE8C}"/>
+              </a:ext>
+            </a:extLst>
+          </p:cNvPr>
+          <p:cNvGrpSpPr/>
+          <p:nvPr/>
+        </p:nvGrpSpPr>
+        <p:grpSpPr>
+          <a:xfrm>
+            <a:off x="2150381" y="1272658"/>
+            <a:ext cx="1316843" cy="169277"/>
+            <a:chOff x="2150381" y="1546064"/>
+            <a:chExt cx="1316843" cy="169277"/>
+          </a:xfrm>
+        </p:grpSpPr>
+        <p:pic>
+          <p:nvPicPr>
+            <p:cNvPr id="7" name="그림 6">
               <a:extLst>
                 <a:ext uri="{FF2B5EF4-FFF2-40B4-BE49-F238E27FC236}">
-                  <a16:creationId xmlns:a16="http://schemas.microsoft.com/office/drawing/2014/main" id="{0C69EBBA-76A1-7948-AF21-4E6F0C738A2B}"/>
+                  <a16:creationId xmlns:a16="http://schemas.microsoft.com/office/drawing/2014/main" id="{30B6CE12-F8CB-405B-9F00-C8E68AAB650D}"/>
                 </a:ext>
               </a:extLst>
             </p:cNvPr>
-            <p:cNvSpPr txBox="1"/>
+            <p:cNvPicPr>
+              <a:picLocks noChangeAspect="1"/>
+            </p:cNvPicPr>
             <p:nvPr/>
-          </p:nvSpPr>
+          </p:nvPicPr>
+          <p:blipFill>
+            <a:blip r:embed="rId11">
+              <a:extLst>
+                <a:ext uri="{28A0092B-C50C-407E-A947-70E740481C1C}">
+                  <a14:useLocalDpi xmlns:a14="http://schemas.microsoft.com/office/drawing/2010/main" val="0"/>
+                </a:ext>
+              </a:extLst>
+            </a:blip>
+            <a:stretch>
+              <a:fillRect/>
+            </a:stretch>
+          </p:blipFill>
           <p:spPr>
             <a:xfrm>
-              <a:off x="2652081" y="1353318"/>
-              <a:ext cx="815146" cy="169277"/>
+              <a:off x="2150381" y="1570563"/>
+              <a:ext cx="477153" cy="105991"/>
             </a:xfrm>
             <a:prstGeom prst="rect">
               <a:avLst/>
             </a:prstGeom>
-            <a:noFill/>
           </p:spPr>
-          <p:txBody>
-            <a:bodyPr wrap="square" rtlCol="0">
-              <a:spAutoFit/>
-            </a:bodyPr>
-            <a:lstStyle/>
-            <a:p>
-              <a:r>
-                <a:rPr lang="en-US" altLang="ko-KR" sz="500">
-                  <a:latin typeface="JejuGothic" panose="02000300000000000000" pitchFamily="2" charset="-127"/>
-                  <a:ea typeface="JejuGothic" panose="02000300000000000000" pitchFamily="2" charset="-127"/>
-                </a:rPr>
-                <a:t>NAVER </a:t>
-              </a:r>
-              <a:r>
-                <a:rPr lang="ko-KR" altLang="en-US" sz="500">
-                  <a:latin typeface="JejuGothic" panose="02000300000000000000" pitchFamily="2" charset="-127"/>
-                  <a:ea typeface="JejuGothic" panose="02000300000000000000" pitchFamily="2" charset="-127"/>
-                </a:rPr>
-                <a:t>천주룡</a:t>
-              </a:r>
-              <a:endParaRPr lang="ko-KR" altLang="en-US" sz="500" dirty="0">
-                <a:latin typeface="JejuGothic" panose="02000300000000000000" pitchFamily="2" charset="-127"/>
-                <a:ea typeface="JejuGothic" panose="02000300000000000000" pitchFamily="2" charset="-127"/>
-              </a:endParaRPr>
-            </a:p>
-          </p:txBody>
-        </p:sp>
+        </p:pic>
         <p:sp>
           <p:nvSpPr>
             <p:cNvPr id="1081" name="TextBox 1080">
@@ -6544,6 +6604,62 @@
             </a:p>
           </p:txBody>
         </p:sp>
+      </p:grpSp>
+      <p:grpSp>
+        <p:nvGrpSpPr>
+          <p:cNvPr id="50" name="그룹 49">
+            <a:extLst>
+              <a:ext uri="{FF2B5EF4-FFF2-40B4-BE49-F238E27FC236}">
+                <a16:creationId xmlns:a16="http://schemas.microsoft.com/office/drawing/2014/main" id="{21202EDE-8342-8A60-CEBE-C87F7FFC24FE}"/>
+              </a:ext>
+            </a:extLst>
+          </p:cNvPr>
+          <p:cNvGrpSpPr/>
+          <p:nvPr/>
+        </p:nvGrpSpPr>
+        <p:grpSpPr>
+          <a:xfrm>
+            <a:off x="2497378" y="1457466"/>
+            <a:ext cx="969845" cy="169277"/>
+            <a:chOff x="2497378" y="1738810"/>
+            <a:chExt cx="969845" cy="169277"/>
+          </a:xfrm>
+        </p:grpSpPr>
+        <p:pic>
+          <p:nvPicPr>
+            <p:cNvPr id="84" name="그림 83">
+              <a:extLst>
+                <a:ext uri="{FF2B5EF4-FFF2-40B4-BE49-F238E27FC236}">
+                  <a16:creationId xmlns:a16="http://schemas.microsoft.com/office/drawing/2014/main" id="{15444870-8857-4C7C-B83D-45D83640DDEB}"/>
+                </a:ext>
+              </a:extLst>
+            </p:cNvPr>
+            <p:cNvPicPr>
+              <a:picLocks noChangeAspect="1"/>
+            </p:cNvPicPr>
+            <p:nvPr/>
+          </p:nvPicPr>
+          <p:blipFill rotWithShape="1">
+            <a:blip r:embed="rId9">
+              <a:extLst>
+                <a:ext uri="{28A0092B-C50C-407E-A947-70E740481C1C}">
+                  <a14:useLocalDpi xmlns:a14="http://schemas.microsoft.com/office/drawing/2010/main" val="0"/>
+                </a:ext>
+              </a:extLst>
+            </a:blip>
+            <a:srcRect l="13117" t="15493" r="12280" b="11649"/>
+            <a:stretch/>
+          </p:blipFill>
+          <p:spPr>
+            <a:xfrm>
+              <a:off x="2497378" y="1762234"/>
+              <a:ext cx="126881" cy="114382"/>
+            </a:xfrm>
+            <a:prstGeom prst="rect">
+              <a:avLst/>
+            </a:prstGeom>
+          </p:spPr>
+        </p:pic>
         <p:sp>
           <p:nvSpPr>
             <p:cNvPr id="1082" name="TextBox 1081">
@@ -6593,55 +6709,63 @@
             </a:p>
           </p:txBody>
         </p:sp>
-        <p:sp>
-          <p:nvSpPr>
-            <p:cNvPr id="1083" name="TextBox 1082">
+      </p:grpSp>
+      <p:grpSp>
+        <p:nvGrpSpPr>
+          <p:cNvPr id="52" name="그룹 51">
+            <a:extLst>
+              <a:ext uri="{FF2B5EF4-FFF2-40B4-BE49-F238E27FC236}">
+                <a16:creationId xmlns:a16="http://schemas.microsoft.com/office/drawing/2014/main" id="{4DD3D564-8902-452F-0B04-C750A602AB4A}"/>
+              </a:ext>
+            </a:extLst>
+          </p:cNvPr>
+          <p:cNvGrpSpPr/>
+          <p:nvPr/>
+        </p:nvGrpSpPr>
+        <p:grpSpPr>
+          <a:xfrm>
+            <a:off x="2112894" y="1827082"/>
+            <a:ext cx="1354329" cy="169277"/>
+            <a:chOff x="2112894" y="2124302"/>
+            <a:chExt cx="1354329" cy="169277"/>
+          </a:xfrm>
+        </p:grpSpPr>
+        <p:pic>
+          <p:nvPicPr>
+            <p:cNvPr id="87" name="그림 86">
               <a:extLst>
                 <a:ext uri="{FF2B5EF4-FFF2-40B4-BE49-F238E27FC236}">
-                  <a16:creationId xmlns:a16="http://schemas.microsoft.com/office/drawing/2014/main" id="{5F671D0D-E93F-9455-58F3-C9EE056C804F}"/>
+                  <a16:creationId xmlns:a16="http://schemas.microsoft.com/office/drawing/2014/main" id="{B6B46AF4-0C94-419A-ADD2-90B29F74979A}"/>
                 </a:ext>
               </a:extLst>
             </p:cNvPr>
-            <p:cNvSpPr txBox="1"/>
+            <p:cNvPicPr>
+              <a:picLocks noChangeAspect="1"/>
+            </p:cNvPicPr>
             <p:nvPr/>
-          </p:nvSpPr>
+          </p:nvPicPr>
+          <p:blipFill>
+            <a:blip r:embed="rId12">
+              <a:extLst>
+                <a:ext uri="{28A0092B-C50C-407E-A947-70E740481C1C}">
+                  <a14:useLocalDpi xmlns:a14="http://schemas.microsoft.com/office/drawing/2010/main" val="0"/>
+                </a:ext>
+              </a:extLst>
+            </a:blip>
+            <a:stretch>
+              <a:fillRect/>
+            </a:stretch>
+          </p:blipFill>
           <p:spPr>
             <a:xfrm>
-              <a:off x="2652080" y="1931556"/>
-              <a:ext cx="815143" cy="169277"/>
+              <a:off x="2112894" y="2156970"/>
+              <a:ext cx="510034" cy="107016"/>
             </a:xfrm>
             <a:prstGeom prst="rect">
               <a:avLst/>
             </a:prstGeom>
-            <a:noFill/>
           </p:spPr>
-          <p:txBody>
-            <a:bodyPr wrap="square" rtlCol="0">
-              <a:spAutoFit/>
-            </a:bodyPr>
-            <a:lstStyle/>
-            <a:p>
-              <a:r>
-                <a:rPr lang="en-US" altLang="ko-KR" sz="500">
-                  <a:latin typeface="JejuGothic" panose="02000300000000000000" pitchFamily="2" charset="-127"/>
-                  <a:ea typeface="JejuGothic" panose="02000300000000000000" pitchFamily="2" charset="-127"/>
-                </a:rPr>
-                <a:t>NAVER </a:t>
-              </a:r>
-              <a:r>
-                <a:rPr lang="ko-KR" altLang="en-US" sz="500">
-                  <a:latin typeface="JejuGothic" panose="02000300000000000000" pitchFamily="2" charset="-127"/>
-                  <a:ea typeface="JejuGothic" panose="02000300000000000000" pitchFamily="2" charset="-127"/>
-                </a:rPr>
-                <a:t>윤정민</a:t>
-              </a:r>
-              <a:endParaRPr lang="ko-KR" altLang="en-US" sz="500" dirty="0">
-                <a:latin typeface="JejuGothic" panose="02000300000000000000" pitchFamily="2" charset="-127"/>
-                <a:ea typeface="JejuGothic" panose="02000300000000000000" pitchFamily="2" charset="-127"/>
-              </a:endParaRPr>
-            </a:p>
-          </p:txBody>
-        </p:sp>
+        </p:pic>
         <p:sp>
           <p:nvSpPr>
             <p:cNvPr id="1084" name="TextBox 1083">
@@ -6705,6 +6829,448 @@
             </a:p>
           </p:txBody>
         </p:sp>
+      </p:grpSp>
+      <p:grpSp>
+        <p:nvGrpSpPr>
+          <p:cNvPr id="57" name="그룹 56">
+            <a:extLst>
+              <a:ext uri="{FF2B5EF4-FFF2-40B4-BE49-F238E27FC236}">
+                <a16:creationId xmlns:a16="http://schemas.microsoft.com/office/drawing/2014/main" id="{8902F8D6-55BE-9B2D-CBC4-D34B7778FC35}"/>
+              </a:ext>
+            </a:extLst>
+          </p:cNvPr>
+          <p:cNvGrpSpPr/>
+          <p:nvPr/>
+        </p:nvGrpSpPr>
+        <p:grpSpPr>
+          <a:xfrm>
+            <a:off x="2425948" y="2566314"/>
+            <a:ext cx="1042625" cy="169277"/>
+            <a:chOff x="2425948" y="2895170"/>
+            <a:chExt cx="1042625" cy="169277"/>
+          </a:xfrm>
+        </p:grpSpPr>
+        <p:pic>
+          <p:nvPicPr>
+            <p:cNvPr id="101" name="그림 100">
+              <a:extLst>
+                <a:ext uri="{FF2B5EF4-FFF2-40B4-BE49-F238E27FC236}">
+                  <a16:creationId xmlns:a16="http://schemas.microsoft.com/office/drawing/2014/main" id="{EF57EFA2-6BB5-4B41-BCFC-32884E76BCEE}"/>
+                </a:ext>
+              </a:extLst>
+            </p:cNvPr>
+            <p:cNvPicPr>
+              <a:picLocks noChangeAspect="1"/>
+            </p:cNvPicPr>
+            <p:nvPr/>
+          </p:nvPicPr>
+          <p:blipFill>
+            <a:blip r:embed="rId13">
+              <a:extLst>
+                <a:ext uri="{28A0092B-C50C-407E-A947-70E740481C1C}">
+                  <a14:useLocalDpi xmlns:a14="http://schemas.microsoft.com/office/drawing/2010/main" val="0"/>
+                </a:ext>
+              </a:extLst>
+            </a:blip>
+            <a:stretch>
+              <a:fillRect/>
+            </a:stretch>
+          </p:blipFill>
+          <p:spPr>
+            <a:xfrm>
+              <a:off x="2425948" y="2926200"/>
+              <a:ext cx="196980" cy="107216"/>
+            </a:xfrm>
+            <a:prstGeom prst="rect">
+              <a:avLst/>
+            </a:prstGeom>
+          </p:spPr>
+        </p:pic>
+        <p:sp>
+          <p:nvSpPr>
+            <p:cNvPr id="1088" name="TextBox 1087">
+              <a:extLst>
+                <a:ext uri="{FF2B5EF4-FFF2-40B4-BE49-F238E27FC236}">
+                  <a16:creationId xmlns:a16="http://schemas.microsoft.com/office/drawing/2014/main" id="{9F9864EC-41CC-C789-73B8-127FE42BA861}"/>
+                </a:ext>
+              </a:extLst>
+            </p:cNvPr>
+            <p:cNvSpPr txBox="1"/>
+            <p:nvPr/>
+          </p:nvSpPr>
+          <p:spPr>
+            <a:xfrm>
+              <a:off x="2651373" y="2895170"/>
+              <a:ext cx="817200" cy="169277"/>
+            </a:xfrm>
+            <a:prstGeom prst="rect">
+              <a:avLst/>
+            </a:prstGeom>
+            <a:noFill/>
+          </p:spPr>
+          <p:txBody>
+            <a:bodyPr wrap="square" rtlCol="0">
+              <a:spAutoFit/>
+            </a:bodyPr>
+            <a:lstStyle/>
+            <a:p>
+              <a:r>
+                <a:rPr lang="en-US" altLang="ko-KR" sz="500">
+                  <a:latin typeface="JejuGothic" panose="02000300000000000000" pitchFamily="2" charset="-127"/>
+                  <a:ea typeface="JejuGothic" panose="02000300000000000000" pitchFamily="2" charset="-127"/>
+                </a:rPr>
+                <a:t>NCSOFT </a:t>
+              </a:r>
+              <a:r>
+                <a:rPr lang="ko-KR" altLang="en-US" sz="500">
+                  <a:latin typeface="JejuGothic" panose="02000300000000000000" pitchFamily="2" charset="-127"/>
+                  <a:ea typeface="JejuGothic" panose="02000300000000000000" pitchFamily="2" charset="-127"/>
+                </a:rPr>
+                <a:t>김기환</a:t>
+              </a:r>
+              <a:endParaRPr lang="ko-KR" altLang="en-US" sz="500" dirty="0">
+                <a:latin typeface="JejuGothic" panose="02000300000000000000" pitchFamily="2" charset="-127"/>
+                <a:ea typeface="JejuGothic" panose="02000300000000000000" pitchFamily="2" charset="-127"/>
+              </a:endParaRPr>
+            </a:p>
+          </p:txBody>
+        </p:sp>
+      </p:grpSp>
+      <p:grpSp>
+        <p:nvGrpSpPr>
+          <p:cNvPr id="48" name="그룹 47">
+            <a:extLst>
+              <a:ext uri="{FF2B5EF4-FFF2-40B4-BE49-F238E27FC236}">
+                <a16:creationId xmlns:a16="http://schemas.microsoft.com/office/drawing/2014/main" id="{DBBF3370-196C-4FA8-CCC1-EB3DA9BC0994}"/>
+              </a:ext>
+            </a:extLst>
+          </p:cNvPr>
+          <p:cNvGrpSpPr/>
+          <p:nvPr/>
+        </p:nvGrpSpPr>
+        <p:grpSpPr>
+          <a:xfrm>
+            <a:off x="2161764" y="1087850"/>
+            <a:ext cx="1305463" cy="169277"/>
+            <a:chOff x="2161764" y="1353318"/>
+            <a:chExt cx="1305463" cy="169277"/>
+          </a:xfrm>
+        </p:grpSpPr>
+        <p:sp>
+          <p:nvSpPr>
+            <p:cNvPr id="1080" name="TextBox 1079">
+              <a:extLst>
+                <a:ext uri="{FF2B5EF4-FFF2-40B4-BE49-F238E27FC236}">
+                  <a16:creationId xmlns:a16="http://schemas.microsoft.com/office/drawing/2014/main" id="{0C69EBBA-76A1-7948-AF21-4E6F0C738A2B}"/>
+                </a:ext>
+              </a:extLst>
+            </p:cNvPr>
+            <p:cNvSpPr txBox="1"/>
+            <p:nvPr/>
+          </p:nvSpPr>
+          <p:spPr>
+            <a:xfrm>
+              <a:off x="2652081" y="1353318"/>
+              <a:ext cx="815146" cy="169277"/>
+            </a:xfrm>
+            <a:prstGeom prst="rect">
+              <a:avLst/>
+            </a:prstGeom>
+            <a:noFill/>
+          </p:spPr>
+          <p:txBody>
+            <a:bodyPr wrap="square" rtlCol="0">
+              <a:spAutoFit/>
+            </a:bodyPr>
+            <a:lstStyle/>
+            <a:p>
+              <a:r>
+                <a:rPr lang="en-US" altLang="ko-KR" sz="500">
+                  <a:latin typeface="JejuGothic" panose="02000300000000000000" pitchFamily="2" charset="-127"/>
+                  <a:ea typeface="JejuGothic" panose="02000300000000000000" pitchFamily="2" charset="-127"/>
+                </a:rPr>
+                <a:t>NAVER </a:t>
+              </a:r>
+              <a:r>
+                <a:rPr lang="ko-KR" altLang="en-US" sz="500">
+                  <a:latin typeface="JejuGothic" panose="02000300000000000000" pitchFamily="2" charset="-127"/>
+                  <a:ea typeface="JejuGothic" panose="02000300000000000000" pitchFamily="2" charset="-127"/>
+                </a:rPr>
+                <a:t>천주룡</a:t>
+              </a:r>
+              <a:endParaRPr lang="ko-KR" altLang="en-US" sz="500" dirty="0">
+                <a:latin typeface="JejuGothic" panose="02000300000000000000" pitchFamily="2" charset="-127"/>
+                <a:ea typeface="JejuGothic" panose="02000300000000000000" pitchFamily="2" charset="-127"/>
+              </a:endParaRPr>
+            </a:p>
+          </p:txBody>
+        </p:sp>
+        <p:pic>
+          <p:nvPicPr>
+            <p:cNvPr id="1091" name="그림 1090" descr="그리기이(가) 표시된 사진&#10;&#10;자동 생성된 설명">
+              <a:extLst>
+                <a:ext uri="{FF2B5EF4-FFF2-40B4-BE49-F238E27FC236}">
+                  <a16:creationId xmlns:a16="http://schemas.microsoft.com/office/drawing/2014/main" id="{8B495E15-C7BB-13DC-ADB6-F63841E8F7B3}"/>
+                </a:ext>
+              </a:extLst>
+            </p:cNvPr>
+            <p:cNvPicPr>
+              <a:picLocks noChangeAspect="1"/>
+            </p:cNvPicPr>
+            <p:nvPr/>
+          </p:nvPicPr>
+          <p:blipFill rotWithShape="1">
+            <a:blip r:embed="rId10">
+              <a:extLst>
+                <a:ext uri="{28A0092B-C50C-407E-A947-70E740481C1C}">
+                  <a14:useLocalDpi xmlns:a14="http://schemas.microsoft.com/office/drawing/2010/main" val="0"/>
+                </a:ext>
+              </a:extLst>
+            </a:blip>
+            <a:srcRect l="27716" t="34418" r="1459" b="21317"/>
+            <a:stretch/>
+          </p:blipFill>
+          <p:spPr>
+            <a:xfrm>
+              <a:off x="2161764" y="1392056"/>
+              <a:ext cx="465975" cy="88986"/>
+            </a:xfrm>
+            <a:prstGeom prst="rect">
+              <a:avLst/>
+            </a:prstGeom>
+          </p:spPr>
+        </p:pic>
+      </p:grpSp>
+      <p:grpSp>
+        <p:nvGrpSpPr>
+          <p:cNvPr id="51" name="그룹 50">
+            <a:extLst>
+              <a:ext uri="{FF2B5EF4-FFF2-40B4-BE49-F238E27FC236}">
+                <a16:creationId xmlns:a16="http://schemas.microsoft.com/office/drawing/2014/main" id="{7A85D756-B305-E5DF-D6F8-89004CDEC103}"/>
+              </a:ext>
+            </a:extLst>
+          </p:cNvPr>
+          <p:cNvGrpSpPr/>
+          <p:nvPr/>
+        </p:nvGrpSpPr>
+        <p:grpSpPr>
+          <a:xfrm>
+            <a:off x="2161764" y="1642274"/>
+            <a:ext cx="1305459" cy="169277"/>
+            <a:chOff x="2161764" y="1931556"/>
+            <a:chExt cx="1305459" cy="169277"/>
+          </a:xfrm>
+        </p:grpSpPr>
+        <p:sp>
+          <p:nvSpPr>
+            <p:cNvPr id="1083" name="TextBox 1082">
+              <a:extLst>
+                <a:ext uri="{FF2B5EF4-FFF2-40B4-BE49-F238E27FC236}">
+                  <a16:creationId xmlns:a16="http://schemas.microsoft.com/office/drawing/2014/main" id="{5F671D0D-E93F-9455-58F3-C9EE056C804F}"/>
+                </a:ext>
+              </a:extLst>
+            </p:cNvPr>
+            <p:cNvSpPr txBox="1"/>
+            <p:nvPr/>
+          </p:nvSpPr>
+          <p:spPr>
+            <a:xfrm>
+              <a:off x="2652080" y="1931556"/>
+              <a:ext cx="815143" cy="169277"/>
+            </a:xfrm>
+            <a:prstGeom prst="rect">
+              <a:avLst/>
+            </a:prstGeom>
+            <a:noFill/>
+          </p:spPr>
+          <p:txBody>
+            <a:bodyPr wrap="square" rtlCol="0">
+              <a:spAutoFit/>
+            </a:bodyPr>
+            <a:lstStyle/>
+            <a:p>
+              <a:r>
+                <a:rPr lang="en-US" altLang="ko-KR" sz="500">
+                  <a:latin typeface="JejuGothic" panose="02000300000000000000" pitchFamily="2" charset="-127"/>
+                  <a:ea typeface="JejuGothic" panose="02000300000000000000" pitchFamily="2" charset="-127"/>
+                </a:rPr>
+                <a:t>NAVER </a:t>
+              </a:r>
+              <a:r>
+                <a:rPr lang="ko-KR" altLang="en-US" sz="500">
+                  <a:latin typeface="JejuGothic" panose="02000300000000000000" pitchFamily="2" charset="-127"/>
+                  <a:ea typeface="JejuGothic" panose="02000300000000000000" pitchFamily="2" charset="-127"/>
+                </a:rPr>
+                <a:t>윤정민</a:t>
+              </a:r>
+              <a:endParaRPr lang="ko-KR" altLang="en-US" sz="500" dirty="0">
+                <a:latin typeface="JejuGothic" panose="02000300000000000000" pitchFamily="2" charset="-127"/>
+                <a:ea typeface="JejuGothic" panose="02000300000000000000" pitchFamily="2" charset="-127"/>
+              </a:endParaRPr>
+            </a:p>
+          </p:txBody>
+        </p:sp>
+        <p:pic>
+          <p:nvPicPr>
+            <p:cNvPr id="1092" name="그림 1091" descr="그리기이(가) 표시된 사진&#10;&#10;자동 생성된 설명">
+              <a:extLst>
+                <a:ext uri="{FF2B5EF4-FFF2-40B4-BE49-F238E27FC236}">
+                  <a16:creationId xmlns:a16="http://schemas.microsoft.com/office/drawing/2014/main" id="{B6C0685B-60C5-0B09-65C1-DF62AC473382}"/>
+                </a:ext>
+              </a:extLst>
+            </p:cNvPr>
+            <p:cNvPicPr>
+              <a:picLocks noChangeAspect="1"/>
+            </p:cNvPicPr>
+            <p:nvPr/>
+          </p:nvPicPr>
+          <p:blipFill rotWithShape="1">
+            <a:blip r:embed="rId10">
+              <a:extLst>
+                <a:ext uri="{28A0092B-C50C-407E-A947-70E740481C1C}">
+                  <a14:useLocalDpi xmlns:a14="http://schemas.microsoft.com/office/drawing/2010/main" val="0"/>
+                </a:ext>
+              </a:extLst>
+            </a:blip>
+            <a:srcRect l="27716" t="34418" r="1459" b="21317"/>
+            <a:stretch/>
+          </p:blipFill>
+          <p:spPr>
+            <a:xfrm>
+              <a:off x="2161764" y="1970536"/>
+              <a:ext cx="465975" cy="88986"/>
+            </a:xfrm>
+            <a:prstGeom prst="rect">
+              <a:avLst/>
+            </a:prstGeom>
+          </p:spPr>
+        </p:pic>
+      </p:grpSp>
+      <p:grpSp>
+        <p:nvGrpSpPr>
+          <p:cNvPr id="55" name="그룹 54">
+            <a:extLst>
+              <a:ext uri="{FF2B5EF4-FFF2-40B4-BE49-F238E27FC236}">
+                <a16:creationId xmlns:a16="http://schemas.microsoft.com/office/drawing/2014/main" id="{1E694935-67E0-147D-DAB1-5DDACF050536}"/>
+              </a:ext>
+            </a:extLst>
+          </p:cNvPr>
+          <p:cNvGrpSpPr/>
+          <p:nvPr/>
+        </p:nvGrpSpPr>
+        <p:grpSpPr>
+          <a:xfrm>
+            <a:off x="2161764" y="2196698"/>
+            <a:ext cx="1305459" cy="169277"/>
+            <a:chOff x="2161764" y="2509794"/>
+            <a:chExt cx="1305459" cy="169277"/>
+          </a:xfrm>
+        </p:grpSpPr>
+        <p:sp>
+          <p:nvSpPr>
+            <p:cNvPr id="1086" name="TextBox 1085">
+              <a:extLst>
+                <a:ext uri="{FF2B5EF4-FFF2-40B4-BE49-F238E27FC236}">
+                  <a16:creationId xmlns:a16="http://schemas.microsoft.com/office/drawing/2014/main" id="{45388DF2-6EE0-7F27-D430-F4CAFA02494D}"/>
+                </a:ext>
+              </a:extLst>
+            </p:cNvPr>
+            <p:cNvSpPr txBox="1"/>
+            <p:nvPr/>
+          </p:nvSpPr>
+          <p:spPr>
+            <a:xfrm>
+              <a:off x="2652081" y="2509794"/>
+              <a:ext cx="815142" cy="169277"/>
+            </a:xfrm>
+            <a:prstGeom prst="rect">
+              <a:avLst/>
+            </a:prstGeom>
+            <a:noFill/>
+          </p:spPr>
+          <p:txBody>
+            <a:bodyPr wrap="square" rtlCol="0">
+              <a:spAutoFit/>
+            </a:bodyPr>
+            <a:lstStyle/>
+            <a:p>
+              <a:r>
+                <a:rPr lang="en-US" altLang="ko-KR" sz="500">
+                  <a:latin typeface="JejuGothic" panose="02000300000000000000" pitchFamily="2" charset="-127"/>
+                  <a:ea typeface="JejuGothic" panose="02000300000000000000" pitchFamily="2" charset="-127"/>
+                </a:rPr>
+                <a:t>NAVER </a:t>
+              </a:r>
+              <a:r>
+                <a:rPr lang="ko-KR" altLang="en-US" sz="500">
+                  <a:latin typeface="JejuGothic" panose="02000300000000000000" pitchFamily="2" charset="-127"/>
+                  <a:ea typeface="JejuGothic" panose="02000300000000000000" pitchFamily="2" charset="-127"/>
+                </a:rPr>
+                <a:t>유홍연</a:t>
+              </a:r>
+              <a:endParaRPr lang="ko-KR" altLang="en-US" sz="500" dirty="0">
+                <a:latin typeface="JejuGothic" panose="02000300000000000000" pitchFamily="2" charset="-127"/>
+                <a:ea typeface="JejuGothic" panose="02000300000000000000" pitchFamily="2" charset="-127"/>
+              </a:endParaRPr>
+            </a:p>
+          </p:txBody>
+        </p:sp>
+        <p:pic>
+          <p:nvPicPr>
+            <p:cNvPr id="1093" name="그림 1092" descr="그리기이(가) 표시된 사진&#10;&#10;자동 생성된 설명">
+              <a:extLst>
+                <a:ext uri="{FF2B5EF4-FFF2-40B4-BE49-F238E27FC236}">
+                  <a16:creationId xmlns:a16="http://schemas.microsoft.com/office/drawing/2014/main" id="{0601E231-5B8E-24A1-9751-CD353EE601E1}"/>
+                </a:ext>
+              </a:extLst>
+            </p:cNvPr>
+            <p:cNvPicPr>
+              <a:picLocks noChangeAspect="1"/>
+            </p:cNvPicPr>
+            <p:nvPr/>
+          </p:nvPicPr>
+          <p:blipFill rotWithShape="1">
+            <a:blip r:embed="rId10">
+              <a:extLst>
+                <a:ext uri="{28A0092B-C50C-407E-A947-70E740481C1C}">
+                  <a14:useLocalDpi xmlns:a14="http://schemas.microsoft.com/office/drawing/2010/main" val="0"/>
+                </a:ext>
+              </a:extLst>
+            </a:blip>
+            <a:srcRect l="27716" t="34418" r="1459" b="21317"/>
+            <a:stretch/>
+          </p:blipFill>
+          <p:spPr>
+            <a:xfrm>
+              <a:off x="2161764" y="2548835"/>
+              <a:ext cx="465975" cy="88986"/>
+            </a:xfrm>
+            <a:prstGeom prst="rect">
+              <a:avLst/>
+            </a:prstGeom>
+          </p:spPr>
+        </p:pic>
+      </p:grpSp>
+      <p:grpSp>
+        <p:nvGrpSpPr>
+          <p:cNvPr id="54" name="그룹 53">
+            <a:extLst>
+              <a:ext uri="{FF2B5EF4-FFF2-40B4-BE49-F238E27FC236}">
+                <a16:creationId xmlns:a16="http://schemas.microsoft.com/office/drawing/2014/main" id="{37870A4C-1F73-9ACB-8E5B-6E33EE25A37B}"/>
+              </a:ext>
+            </a:extLst>
+          </p:cNvPr>
+          <p:cNvGrpSpPr/>
+          <p:nvPr/>
+        </p:nvGrpSpPr>
+        <p:grpSpPr>
+          <a:xfrm>
+            <a:off x="2112894" y="2011890"/>
+            <a:ext cx="1354329" cy="169277"/>
+            <a:chOff x="2112894" y="2317048"/>
+            <a:chExt cx="1354329" cy="169277"/>
+          </a:xfrm>
+        </p:grpSpPr>
         <p:sp>
           <p:nvSpPr>
             <p:cNvPr id="1085" name="TextBox 1084">
@@ -6768,55 +7334,63 @@
             </a:p>
           </p:txBody>
         </p:sp>
-        <p:sp>
-          <p:nvSpPr>
-            <p:cNvPr id="1086" name="TextBox 1085">
+        <p:pic>
+          <p:nvPicPr>
+            <p:cNvPr id="1094" name="그림 1093">
               <a:extLst>
                 <a:ext uri="{FF2B5EF4-FFF2-40B4-BE49-F238E27FC236}">
-                  <a16:creationId xmlns:a16="http://schemas.microsoft.com/office/drawing/2014/main" id="{45388DF2-6EE0-7F27-D430-F4CAFA02494D}"/>
+                  <a16:creationId xmlns:a16="http://schemas.microsoft.com/office/drawing/2014/main" id="{936544E4-E004-58DC-B7E1-9267F5D3439B}"/>
                 </a:ext>
               </a:extLst>
             </p:cNvPr>
-            <p:cNvSpPr txBox="1"/>
+            <p:cNvPicPr>
+              <a:picLocks noChangeAspect="1"/>
+            </p:cNvPicPr>
             <p:nvPr/>
-          </p:nvSpPr>
+          </p:nvPicPr>
+          <p:blipFill>
+            <a:blip r:embed="rId12">
+              <a:extLst>
+                <a:ext uri="{28A0092B-C50C-407E-A947-70E740481C1C}">
+                  <a14:useLocalDpi xmlns:a14="http://schemas.microsoft.com/office/drawing/2010/main" val="0"/>
+                </a:ext>
+              </a:extLst>
+            </a:blip>
+            <a:stretch>
+              <a:fillRect/>
+            </a:stretch>
+          </p:blipFill>
           <p:spPr>
             <a:xfrm>
-              <a:off x="2652081" y="2509794"/>
-              <a:ext cx="815142" cy="169277"/>
+              <a:off x="2112894" y="2347285"/>
+              <a:ext cx="510034" cy="107016"/>
             </a:xfrm>
             <a:prstGeom prst="rect">
               <a:avLst/>
             </a:prstGeom>
-            <a:noFill/>
           </p:spPr>
-          <p:txBody>
-            <a:bodyPr wrap="square" rtlCol="0">
-              <a:spAutoFit/>
-            </a:bodyPr>
-            <a:lstStyle/>
-            <a:p>
-              <a:r>
-                <a:rPr lang="en-US" altLang="ko-KR" sz="500">
-                  <a:latin typeface="JejuGothic" panose="02000300000000000000" pitchFamily="2" charset="-127"/>
-                  <a:ea typeface="JejuGothic" panose="02000300000000000000" pitchFamily="2" charset="-127"/>
-                </a:rPr>
-                <a:t>NAVER </a:t>
-              </a:r>
-              <a:r>
-                <a:rPr lang="ko-KR" altLang="en-US" sz="500">
-                  <a:latin typeface="JejuGothic" panose="02000300000000000000" pitchFamily="2" charset="-127"/>
-                  <a:ea typeface="JejuGothic" panose="02000300000000000000" pitchFamily="2" charset="-127"/>
-                </a:rPr>
-                <a:t>유홍연</a:t>
-              </a:r>
-              <a:endParaRPr lang="ko-KR" altLang="en-US" sz="500" dirty="0">
-                <a:latin typeface="JejuGothic" panose="02000300000000000000" pitchFamily="2" charset="-127"/>
-                <a:ea typeface="JejuGothic" panose="02000300000000000000" pitchFamily="2" charset="-127"/>
-              </a:endParaRPr>
-            </a:p>
-          </p:txBody>
-        </p:sp>
+        </p:pic>
+      </p:grpSp>
+      <p:grpSp>
+        <p:nvGrpSpPr>
+          <p:cNvPr id="56" name="그룹 55">
+            <a:extLst>
+              <a:ext uri="{FF2B5EF4-FFF2-40B4-BE49-F238E27FC236}">
+                <a16:creationId xmlns:a16="http://schemas.microsoft.com/office/drawing/2014/main" id="{678AF684-0379-0D6D-05F9-F7EDA6B3F74D}"/>
+              </a:ext>
+            </a:extLst>
+          </p:cNvPr>
+          <p:cNvGrpSpPr/>
+          <p:nvPr/>
+        </p:nvGrpSpPr>
+        <p:grpSpPr>
+          <a:xfrm>
+            <a:off x="2112894" y="2381506"/>
+            <a:ext cx="1357376" cy="169277"/>
+            <a:chOff x="2112894" y="2702425"/>
+            <a:chExt cx="1357376" cy="169277"/>
+          </a:xfrm>
+        </p:grpSpPr>
         <p:sp>
           <p:nvSpPr>
             <p:cNvPr id="1087" name="TextBox 1086">
@@ -6880,196 +7454,6 @@
             </a:p>
           </p:txBody>
         </p:sp>
-        <p:sp>
-          <p:nvSpPr>
-            <p:cNvPr id="1088" name="TextBox 1087">
-              <a:extLst>
-                <a:ext uri="{FF2B5EF4-FFF2-40B4-BE49-F238E27FC236}">
-                  <a16:creationId xmlns:a16="http://schemas.microsoft.com/office/drawing/2014/main" id="{9F9864EC-41CC-C789-73B8-127FE42BA861}"/>
-                </a:ext>
-              </a:extLst>
-            </p:cNvPr>
-            <p:cNvSpPr txBox="1"/>
-            <p:nvPr/>
-          </p:nvSpPr>
-          <p:spPr>
-            <a:xfrm>
-              <a:off x="2651373" y="2895170"/>
-              <a:ext cx="817200" cy="169277"/>
-            </a:xfrm>
-            <a:prstGeom prst="rect">
-              <a:avLst/>
-            </a:prstGeom>
-            <a:noFill/>
-          </p:spPr>
-          <p:txBody>
-            <a:bodyPr wrap="square" rtlCol="0">
-              <a:spAutoFit/>
-            </a:bodyPr>
-            <a:lstStyle/>
-            <a:p>
-              <a:r>
-                <a:rPr lang="en-US" altLang="ko-KR" sz="500">
-                  <a:latin typeface="JejuGothic" panose="02000300000000000000" pitchFamily="2" charset="-127"/>
-                  <a:ea typeface="JejuGothic" panose="02000300000000000000" pitchFamily="2" charset="-127"/>
-                </a:rPr>
-                <a:t>NCSOFT </a:t>
-              </a:r>
-              <a:r>
-                <a:rPr lang="ko-KR" altLang="en-US" sz="500">
-                  <a:latin typeface="JejuGothic" panose="02000300000000000000" pitchFamily="2" charset="-127"/>
-                  <a:ea typeface="JejuGothic" panose="02000300000000000000" pitchFamily="2" charset="-127"/>
-                </a:rPr>
-                <a:t>김기환</a:t>
-              </a:r>
-              <a:endParaRPr lang="ko-KR" altLang="en-US" sz="500" dirty="0">
-                <a:latin typeface="JejuGothic" panose="02000300000000000000" pitchFamily="2" charset="-127"/>
-                <a:ea typeface="JejuGothic" panose="02000300000000000000" pitchFamily="2" charset="-127"/>
-              </a:endParaRPr>
-            </a:p>
-          </p:txBody>
-        </p:sp>
-        <p:pic>
-          <p:nvPicPr>
-            <p:cNvPr id="1091" name="그림 1090" descr="그리기이(가) 표시된 사진&#10;&#10;자동 생성된 설명">
-              <a:extLst>
-                <a:ext uri="{FF2B5EF4-FFF2-40B4-BE49-F238E27FC236}">
-                  <a16:creationId xmlns:a16="http://schemas.microsoft.com/office/drawing/2014/main" id="{8B495E15-C7BB-13DC-ADB6-F63841E8F7B3}"/>
-                </a:ext>
-              </a:extLst>
-            </p:cNvPr>
-            <p:cNvPicPr>
-              <a:picLocks noChangeAspect="1"/>
-            </p:cNvPicPr>
-            <p:nvPr/>
-          </p:nvPicPr>
-          <p:blipFill rotWithShape="1">
-            <a:blip r:embed="rId10">
-              <a:extLst>
-                <a:ext uri="{28A0092B-C50C-407E-A947-70E740481C1C}">
-                  <a14:useLocalDpi xmlns:a14="http://schemas.microsoft.com/office/drawing/2010/main" val="0"/>
-                </a:ext>
-              </a:extLst>
-            </a:blip>
-            <a:srcRect l="27716" t="34418" r="1459" b="21317"/>
-            <a:stretch/>
-          </p:blipFill>
-          <p:spPr>
-            <a:xfrm>
-              <a:off x="2161764" y="1392056"/>
-              <a:ext cx="465975" cy="88986"/>
-            </a:xfrm>
-            <a:prstGeom prst="rect">
-              <a:avLst/>
-            </a:prstGeom>
-          </p:spPr>
-        </p:pic>
-        <p:pic>
-          <p:nvPicPr>
-            <p:cNvPr id="1092" name="그림 1091" descr="그리기이(가) 표시된 사진&#10;&#10;자동 생성된 설명">
-              <a:extLst>
-                <a:ext uri="{FF2B5EF4-FFF2-40B4-BE49-F238E27FC236}">
-                  <a16:creationId xmlns:a16="http://schemas.microsoft.com/office/drawing/2014/main" id="{B6C0685B-60C5-0B09-65C1-DF62AC473382}"/>
-                </a:ext>
-              </a:extLst>
-            </p:cNvPr>
-            <p:cNvPicPr>
-              <a:picLocks noChangeAspect="1"/>
-            </p:cNvPicPr>
-            <p:nvPr/>
-          </p:nvPicPr>
-          <p:blipFill rotWithShape="1">
-            <a:blip r:embed="rId10">
-              <a:extLst>
-                <a:ext uri="{28A0092B-C50C-407E-A947-70E740481C1C}">
-                  <a14:useLocalDpi xmlns:a14="http://schemas.microsoft.com/office/drawing/2010/main" val="0"/>
-                </a:ext>
-              </a:extLst>
-            </a:blip>
-            <a:srcRect l="27716" t="34418" r="1459" b="21317"/>
-            <a:stretch/>
-          </p:blipFill>
-          <p:spPr>
-            <a:xfrm>
-              <a:off x="2161764" y="1970536"/>
-              <a:ext cx="465975" cy="88986"/>
-            </a:xfrm>
-            <a:prstGeom prst="rect">
-              <a:avLst/>
-            </a:prstGeom>
-          </p:spPr>
-        </p:pic>
-        <p:pic>
-          <p:nvPicPr>
-            <p:cNvPr id="1093" name="그림 1092" descr="그리기이(가) 표시된 사진&#10;&#10;자동 생성된 설명">
-              <a:extLst>
-                <a:ext uri="{FF2B5EF4-FFF2-40B4-BE49-F238E27FC236}">
-                  <a16:creationId xmlns:a16="http://schemas.microsoft.com/office/drawing/2014/main" id="{0601E231-5B8E-24A1-9751-CD353EE601E1}"/>
-                </a:ext>
-              </a:extLst>
-            </p:cNvPr>
-            <p:cNvPicPr>
-              <a:picLocks noChangeAspect="1"/>
-            </p:cNvPicPr>
-            <p:nvPr/>
-          </p:nvPicPr>
-          <p:blipFill rotWithShape="1">
-            <a:blip r:embed="rId10">
-              <a:extLst>
-                <a:ext uri="{28A0092B-C50C-407E-A947-70E740481C1C}">
-                  <a14:useLocalDpi xmlns:a14="http://schemas.microsoft.com/office/drawing/2010/main" val="0"/>
-                </a:ext>
-              </a:extLst>
-            </a:blip>
-            <a:srcRect l="27716" t="34418" r="1459" b="21317"/>
-            <a:stretch/>
-          </p:blipFill>
-          <p:spPr>
-            <a:xfrm>
-              <a:off x="2161764" y="2548835"/>
-              <a:ext cx="465975" cy="88986"/>
-            </a:xfrm>
-            <a:prstGeom prst="rect">
-              <a:avLst/>
-            </a:prstGeom>
-          </p:spPr>
-        </p:pic>
-        <p:pic>
-          <p:nvPicPr>
-            <p:cNvPr id="1094" name="그림 1093">
-              <a:extLst>
-                <a:ext uri="{FF2B5EF4-FFF2-40B4-BE49-F238E27FC236}">
-                  <a16:creationId xmlns:a16="http://schemas.microsoft.com/office/drawing/2014/main" id="{936544E4-E004-58DC-B7E1-9267F5D3439B}"/>
-                </a:ext>
-              </a:extLst>
-            </p:cNvPr>
-            <p:cNvPicPr>
-              <a:picLocks noChangeAspect="1"/>
-            </p:cNvPicPr>
-            <p:nvPr/>
-          </p:nvPicPr>
-          <p:blipFill>
-            <a:blip r:embed="rId11">
-              <a:extLst>
-                <a:ext uri="{28A0092B-C50C-407E-A947-70E740481C1C}">
-                  <a14:useLocalDpi xmlns:a14="http://schemas.microsoft.com/office/drawing/2010/main" val="0"/>
-                </a:ext>
-              </a:extLst>
-            </a:blip>
-            <a:stretch>
-              <a:fillRect/>
-            </a:stretch>
-          </p:blipFill>
-          <p:spPr>
-            <a:xfrm>
-              <a:off x="2112894" y="2347285"/>
-              <a:ext cx="510034" cy="107016"/>
-            </a:xfrm>
-            <a:prstGeom prst="rect">
-              <a:avLst/>
-            </a:prstGeom>
-          </p:spPr>
-        </p:pic>
         <p:pic>
           <p:nvPicPr>
             <p:cNvPr id="1095" name="그림 1094">
@@ -7085,7 +7469,7 @@
             <p:nvPr/>
           </p:nvPicPr>
           <p:blipFill>
-            <a:blip r:embed="rId11">
+            <a:blip r:embed="rId12">
               <a:extLst>
                 <a:ext uri="{28A0092B-C50C-407E-A947-70E740481C1C}">
                   <a14:useLocalDpi xmlns:a14="http://schemas.microsoft.com/office/drawing/2010/main" val="0"/>
@@ -7109,10 +7493,10 @@
       </p:grpSp>
       <p:grpSp>
         <p:nvGrpSpPr>
-          <p:cNvPr id="1105" name="그룹 1104">
-            <a:extLst>
-              <a:ext uri="{FF2B5EF4-FFF2-40B4-BE49-F238E27FC236}">
-                <a16:creationId xmlns:a16="http://schemas.microsoft.com/office/drawing/2014/main" id="{918D9697-0E15-DB98-0C32-8FFC37B34517}"/>
+          <p:cNvPr id="19" name="그룹 18">
+            <a:extLst>
+              <a:ext uri="{FF2B5EF4-FFF2-40B4-BE49-F238E27FC236}">
+                <a16:creationId xmlns:a16="http://schemas.microsoft.com/office/drawing/2014/main" id="{54113D55-5F83-02F1-A1DD-5C51D14985C5}"/>
               </a:ext>
             </a:extLst>
           </p:cNvPr>
@@ -7121,10 +7505,10 @@
         </p:nvGrpSpPr>
         <p:grpSpPr>
           <a:xfrm>
-            <a:off x="3561894" y="1160572"/>
-            <a:ext cx="1249541" cy="1751323"/>
-            <a:chOff x="3561894" y="1160572"/>
-            <a:chExt cx="1249541" cy="1751323"/>
+            <a:off x="2440439" y="2751122"/>
+            <a:ext cx="1028134" cy="169277"/>
+            <a:chOff x="3780255" y="1160572"/>
+            <a:chExt cx="1028134" cy="169277"/>
           </a:xfrm>
         </p:grpSpPr>
         <p:pic>
@@ -7161,180 +7545,6 @@
             <a:prstGeom prst="rect">
               <a:avLst/>
             </a:prstGeom>
-          </p:spPr>
-        </p:pic>
-        <p:pic>
-          <p:nvPicPr>
-            <p:cNvPr id="109" name="Picture 12" descr="kakao">
-              <a:extLst>
-                <a:ext uri="{FF2B5EF4-FFF2-40B4-BE49-F238E27FC236}">
-                  <a16:creationId xmlns:a16="http://schemas.microsoft.com/office/drawing/2014/main" id="{9DBF7B2A-2065-4DCA-AC50-0278141C275B}"/>
-                </a:ext>
-              </a:extLst>
-            </p:cNvPr>
-            <p:cNvPicPr>
-              <a:picLocks noChangeAspect="1" noChangeArrowheads="1"/>
-            </p:cNvPicPr>
-            <p:nvPr/>
-          </p:nvPicPr>
-          <p:blipFill rotWithShape="1">
-            <a:blip r:embed="rId8">
-              <a:extLst>
-                <a:ext uri="{28A0092B-C50C-407E-A947-70E740481C1C}">
-                  <a14:useLocalDpi xmlns:a14="http://schemas.microsoft.com/office/drawing/2010/main" val="0"/>
-                </a:ext>
-              </a:extLst>
-            </a:blip>
-            <a:srcRect l="24965" t="43726" r="57597" b="43192"/>
-            <a:stretch/>
-          </p:blipFill>
-          <p:spPr bwMode="auto">
-            <a:xfrm>
-              <a:off x="3627617" y="1372301"/>
-              <a:ext cx="340167" cy="108674"/>
-            </a:xfrm>
-            <a:prstGeom prst="rect">
-              <a:avLst/>
-            </a:prstGeom>
-            <a:noFill/>
-            <a:extLst>
-              <a:ext uri="{909E8E84-426E-40DD-AFC4-6F175D3DCCD1}">
-                <a14:hiddenFill xmlns:a14="http://schemas.microsoft.com/office/drawing/2010/main">
-                  <a:solidFill>
-                    <a:srgbClr val="FFFFFF"/>
-                  </a:solidFill>
-                </a14:hiddenFill>
-              </a:ext>
-            </a:extLst>
-          </p:spPr>
-        </p:pic>
-        <p:pic>
-          <p:nvPicPr>
-            <p:cNvPr id="111" name="그림 110" descr="표지판, 그리기, 시계이(가) 표시된 사진&#10;&#10;자동 생성된 설명">
-              <a:extLst>
-                <a:ext uri="{FF2B5EF4-FFF2-40B4-BE49-F238E27FC236}">
-                  <a16:creationId xmlns:a16="http://schemas.microsoft.com/office/drawing/2014/main" id="{2062D24D-CD89-4BC5-8A64-946E837AA239}"/>
-                </a:ext>
-              </a:extLst>
-            </p:cNvPr>
-            <p:cNvPicPr>
-              <a:picLocks noChangeAspect="1"/>
-            </p:cNvPicPr>
-            <p:nvPr/>
-          </p:nvPicPr>
-          <p:blipFill rotWithShape="1">
-            <a:blip r:embed="rId7">
-              <a:extLst>
-                <a:ext uri="{28A0092B-C50C-407E-A947-70E740481C1C}">
-                  <a14:useLocalDpi xmlns:a14="http://schemas.microsoft.com/office/drawing/2010/main" val="0"/>
-                </a:ext>
-              </a:extLst>
-            </a:blip>
-            <a:srcRect r="71957"/>
-            <a:stretch/>
-          </p:blipFill>
-          <p:spPr>
-            <a:xfrm>
-              <a:off x="3834041" y="1565456"/>
-              <a:ext cx="137792" cy="132881"/>
-            </a:xfrm>
-            <a:prstGeom prst="rect">
-              <a:avLst/>
-            </a:prstGeom>
-          </p:spPr>
-        </p:pic>
-        <p:pic>
-          <p:nvPicPr>
-            <p:cNvPr id="1026" name="Picture 2" descr="TmaxSoft">
-              <a:extLst>
-                <a:ext uri="{FF2B5EF4-FFF2-40B4-BE49-F238E27FC236}">
-                  <a16:creationId xmlns:a16="http://schemas.microsoft.com/office/drawing/2014/main" id="{A2B85EFF-8FCE-E6DF-1E61-C077B138595D}"/>
-                </a:ext>
-              </a:extLst>
-            </p:cNvPr>
-            <p:cNvPicPr>
-              <a:picLocks noChangeAspect="1" noChangeArrowheads="1"/>
-            </p:cNvPicPr>
-            <p:nvPr/>
-          </p:nvPicPr>
-          <p:blipFill>
-            <a:blip r:embed="rId14">
-              <a:extLst>
-                <a:ext uri="{28A0092B-C50C-407E-A947-70E740481C1C}">
-                  <a14:useLocalDpi xmlns:a14="http://schemas.microsoft.com/office/drawing/2010/main" val="0"/>
-                </a:ext>
-              </a:extLst>
-            </a:blip>
-            <a:srcRect/>
-            <a:stretch>
-              <a:fillRect/>
-            </a:stretch>
-          </p:blipFill>
-          <p:spPr bwMode="auto">
-            <a:xfrm>
-              <a:off x="3561894" y="1744343"/>
-              <a:ext cx="436722" cy="148084"/>
-            </a:xfrm>
-            <a:prstGeom prst="rect">
-              <a:avLst/>
-            </a:prstGeom>
-            <a:noFill/>
-            <a:extLst>
-              <a:ext uri="{909E8E84-426E-40DD-AFC4-6F175D3DCCD1}">
-                <a14:hiddenFill xmlns:a14="http://schemas.microsoft.com/office/drawing/2010/main">
-                  <a:solidFill>
-                    <a:srgbClr val="FFFFFF"/>
-                  </a:solidFill>
-                </a14:hiddenFill>
-              </a:ext>
-            </a:extLst>
-          </p:spPr>
-        </p:pic>
-        <p:pic>
-          <p:nvPicPr>
-            <p:cNvPr id="1049" name="Picture 4" descr="카카오스탁MAP X 두나무투자일임 투자세미나 &lt;8인8색 주식 투자 이야기&gt; - 이벤터스">
-              <a:extLst>
-                <a:ext uri="{FF2B5EF4-FFF2-40B4-BE49-F238E27FC236}">
-                  <a16:creationId xmlns:a16="http://schemas.microsoft.com/office/drawing/2014/main" id="{B32035EB-E9DE-AB51-D757-2125309D00D1}"/>
-                </a:ext>
-              </a:extLst>
-            </p:cNvPr>
-            <p:cNvPicPr>
-              <a:picLocks noChangeAspect="1" noChangeArrowheads="1"/>
-            </p:cNvPicPr>
-            <p:nvPr/>
-          </p:nvPicPr>
-          <p:blipFill>
-            <a:blip r:embed="rId15">
-              <a:extLst>
-                <a:ext uri="{28A0092B-C50C-407E-A947-70E740481C1C}">
-                  <a14:useLocalDpi xmlns:a14="http://schemas.microsoft.com/office/drawing/2010/main" val="0"/>
-                </a:ext>
-              </a:extLst>
-            </a:blip>
-            <a:srcRect/>
-            <a:stretch>
-              <a:fillRect/>
-            </a:stretch>
-          </p:blipFill>
-          <p:spPr bwMode="auto">
-            <a:xfrm>
-              <a:off x="3599205" y="2688588"/>
-              <a:ext cx="396990" cy="223307"/>
-            </a:xfrm>
-            <a:prstGeom prst="rect">
-              <a:avLst/>
-            </a:prstGeom>
-            <a:noFill/>
-            <a:extLst>
-              <a:ext uri="{909E8E84-426E-40DD-AFC4-6F175D3DCCD1}">
-                <a14:hiddenFill xmlns:a14="http://schemas.microsoft.com/office/drawing/2010/main">
-                  <a:solidFill>
-                    <a:srgbClr val="FFFFFF"/>
-                  </a:solidFill>
-                </a14:hiddenFill>
-              </a:ext>
-            </a:extLst>
           </p:spPr>
         </p:pic>
         <p:sp>
@@ -7386,6 +7596,72 @@
             </a:p>
           </p:txBody>
         </p:sp>
+      </p:grpSp>
+      <p:grpSp>
+        <p:nvGrpSpPr>
+          <p:cNvPr id="20" name="그룹 19">
+            <a:extLst>
+              <a:ext uri="{FF2B5EF4-FFF2-40B4-BE49-F238E27FC236}">
+                <a16:creationId xmlns:a16="http://schemas.microsoft.com/office/drawing/2014/main" id="{33F665F6-959C-A86F-670A-69D77462ABDC}"/>
+              </a:ext>
+            </a:extLst>
+          </p:cNvPr>
+          <p:cNvGrpSpPr/>
+          <p:nvPr/>
+        </p:nvGrpSpPr>
+        <p:grpSpPr>
+          <a:xfrm>
+            <a:off x="2286448" y="2935926"/>
+            <a:ext cx="1180775" cy="169277"/>
+            <a:chOff x="3627617" y="1353318"/>
+            <a:chExt cx="1180775" cy="169277"/>
+          </a:xfrm>
+        </p:grpSpPr>
+        <p:pic>
+          <p:nvPicPr>
+            <p:cNvPr id="109" name="Picture 12" descr="kakao">
+              <a:extLst>
+                <a:ext uri="{FF2B5EF4-FFF2-40B4-BE49-F238E27FC236}">
+                  <a16:creationId xmlns:a16="http://schemas.microsoft.com/office/drawing/2014/main" id="{9DBF7B2A-2065-4DCA-AC50-0278141C275B}"/>
+                </a:ext>
+              </a:extLst>
+            </p:cNvPr>
+            <p:cNvPicPr>
+              <a:picLocks noChangeAspect="1" noChangeArrowheads="1"/>
+            </p:cNvPicPr>
+            <p:nvPr/>
+          </p:nvPicPr>
+          <p:blipFill rotWithShape="1">
+            <a:blip r:embed="rId8">
+              <a:extLst>
+                <a:ext uri="{28A0092B-C50C-407E-A947-70E740481C1C}">
+                  <a14:useLocalDpi xmlns:a14="http://schemas.microsoft.com/office/drawing/2010/main" val="0"/>
+                </a:ext>
+              </a:extLst>
+            </a:blip>
+            <a:srcRect l="24965" t="43726" r="57597" b="43192"/>
+            <a:stretch/>
+          </p:blipFill>
+          <p:spPr bwMode="auto">
+            <a:xfrm>
+              <a:off x="3627617" y="1372301"/>
+              <a:ext cx="340167" cy="108674"/>
+            </a:xfrm>
+            <a:prstGeom prst="rect">
+              <a:avLst/>
+            </a:prstGeom>
+            <a:noFill/>
+            <a:extLst>
+              <a:ext uri="{909E8E84-426E-40DD-AFC4-6F175D3DCCD1}">
+                <a14:hiddenFill xmlns:a14="http://schemas.microsoft.com/office/drawing/2010/main">
+                  <a:solidFill>
+                    <a:srgbClr val="FFFFFF"/>
+                  </a:solidFill>
+                </a14:hiddenFill>
+              </a:ext>
+            </a:extLst>
+          </p:spPr>
+        </p:pic>
         <p:sp>
           <p:nvSpPr>
             <p:cNvPr id="1070" name="TextBox 1069">
@@ -7435,6 +7711,62 @@
             </a:p>
           </p:txBody>
         </p:sp>
+      </p:grpSp>
+      <p:grpSp>
+        <p:nvGrpSpPr>
+          <p:cNvPr id="21" name="그룹 20">
+            <a:extLst>
+              <a:ext uri="{FF2B5EF4-FFF2-40B4-BE49-F238E27FC236}">
+                <a16:creationId xmlns:a16="http://schemas.microsoft.com/office/drawing/2014/main" id="{47DE1699-7C7D-23D9-BF9E-ECA0FFBD24AB}"/>
+              </a:ext>
+            </a:extLst>
+          </p:cNvPr>
+          <p:cNvGrpSpPr/>
+          <p:nvPr/>
+        </p:nvGrpSpPr>
+        <p:grpSpPr>
+          <a:xfrm>
+            <a:off x="3834041" y="1087850"/>
+            <a:ext cx="974348" cy="169277"/>
+            <a:chOff x="3834041" y="1546064"/>
+            <a:chExt cx="974348" cy="169277"/>
+          </a:xfrm>
+        </p:grpSpPr>
+        <p:pic>
+          <p:nvPicPr>
+            <p:cNvPr id="111" name="그림 110" descr="표지판, 그리기, 시계이(가) 표시된 사진&#10;&#10;자동 생성된 설명">
+              <a:extLst>
+                <a:ext uri="{FF2B5EF4-FFF2-40B4-BE49-F238E27FC236}">
+                  <a16:creationId xmlns:a16="http://schemas.microsoft.com/office/drawing/2014/main" id="{2062D24D-CD89-4BC5-8A64-946E837AA239}"/>
+                </a:ext>
+              </a:extLst>
+            </p:cNvPr>
+            <p:cNvPicPr>
+              <a:picLocks noChangeAspect="1"/>
+            </p:cNvPicPr>
+            <p:nvPr/>
+          </p:nvPicPr>
+          <p:blipFill rotWithShape="1">
+            <a:blip r:embed="rId7">
+              <a:extLst>
+                <a:ext uri="{28A0092B-C50C-407E-A947-70E740481C1C}">
+                  <a14:useLocalDpi xmlns:a14="http://schemas.microsoft.com/office/drawing/2010/main" val="0"/>
+                </a:ext>
+              </a:extLst>
+            </a:blip>
+            <a:srcRect r="71957"/>
+            <a:stretch/>
+          </p:blipFill>
+          <p:spPr>
+            <a:xfrm>
+              <a:off x="3834041" y="1565456"/>
+              <a:ext cx="137792" cy="132881"/>
+            </a:xfrm>
+            <a:prstGeom prst="rect">
+              <a:avLst/>
+            </a:prstGeom>
+          </p:spPr>
+        </p:pic>
         <p:sp>
           <p:nvSpPr>
             <p:cNvPr id="1071" name="TextBox 1070">
@@ -7498,6 +7830,74 @@
             </a:p>
           </p:txBody>
         </p:sp>
+      </p:grpSp>
+      <p:grpSp>
+        <p:nvGrpSpPr>
+          <p:cNvPr id="22" name="그룹 21">
+            <a:extLst>
+              <a:ext uri="{FF2B5EF4-FFF2-40B4-BE49-F238E27FC236}">
+                <a16:creationId xmlns:a16="http://schemas.microsoft.com/office/drawing/2014/main" id="{58214868-9C05-9C11-0C1C-5E9DEB3338EB}"/>
+              </a:ext>
+            </a:extLst>
+          </p:cNvPr>
+          <p:cNvGrpSpPr/>
+          <p:nvPr/>
+        </p:nvGrpSpPr>
+        <p:grpSpPr>
+          <a:xfrm>
+            <a:off x="3561894" y="1267255"/>
+            <a:ext cx="1246494" cy="169277"/>
+            <a:chOff x="3561894" y="1738810"/>
+            <a:chExt cx="1246494" cy="169277"/>
+          </a:xfrm>
+        </p:grpSpPr>
+        <p:pic>
+          <p:nvPicPr>
+            <p:cNvPr id="1026" name="Picture 2" descr="TmaxSoft">
+              <a:extLst>
+                <a:ext uri="{FF2B5EF4-FFF2-40B4-BE49-F238E27FC236}">
+                  <a16:creationId xmlns:a16="http://schemas.microsoft.com/office/drawing/2014/main" id="{A2B85EFF-8FCE-E6DF-1E61-C077B138595D}"/>
+                </a:ext>
+              </a:extLst>
+            </p:cNvPr>
+            <p:cNvPicPr>
+              <a:picLocks noChangeAspect="1" noChangeArrowheads="1"/>
+            </p:cNvPicPr>
+            <p:nvPr/>
+          </p:nvPicPr>
+          <p:blipFill>
+            <a:blip r:embed="rId14">
+              <a:extLst>
+                <a:ext uri="{28A0092B-C50C-407E-A947-70E740481C1C}">
+                  <a14:useLocalDpi xmlns:a14="http://schemas.microsoft.com/office/drawing/2010/main" val="0"/>
+                </a:ext>
+              </a:extLst>
+            </a:blip>
+            <a:srcRect/>
+            <a:stretch>
+              <a:fillRect/>
+            </a:stretch>
+          </p:blipFill>
+          <p:spPr bwMode="auto">
+            <a:xfrm>
+              <a:off x="3561894" y="1744343"/>
+              <a:ext cx="436722" cy="148084"/>
+            </a:xfrm>
+            <a:prstGeom prst="rect">
+              <a:avLst/>
+            </a:prstGeom>
+            <a:noFill/>
+            <a:extLst>
+              <a:ext uri="{909E8E84-426E-40DD-AFC4-6F175D3DCCD1}">
+                <a14:hiddenFill xmlns:a14="http://schemas.microsoft.com/office/drawing/2010/main">
+                  <a:solidFill>
+                    <a:srgbClr val="FFFFFF"/>
+                  </a:solidFill>
+                </a14:hiddenFill>
+              </a:ext>
+            </a:extLst>
+          </p:spPr>
+        </p:pic>
         <p:sp>
           <p:nvSpPr>
             <p:cNvPr id="1072" name="TextBox 1071">
@@ -7547,6 +7947,137 @@
             </a:p>
           </p:txBody>
         </p:sp>
+      </p:grpSp>
+      <p:grpSp>
+        <p:nvGrpSpPr>
+          <p:cNvPr id="46" name="그룹 45">
+            <a:extLst>
+              <a:ext uri="{FF2B5EF4-FFF2-40B4-BE49-F238E27FC236}">
+                <a16:creationId xmlns:a16="http://schemas.microsoft.com/office/drawing/2014/main" id="{5EC0EE86-062A-9081-8B53-1ECB90BDF85E}"/>
+              </a:ext>
+            </a:extLst>
+          </p:cNvPr>
+          <p:cNvGrpSpPr/>
+          <p:nvPr/>
+        </p:nvGrpSpPr>
+        <p:grpSpPr>
+          <a:xfrm>
+            <a:off x="3599205" y="2164280"/>
+            <a:ext cx="1212230" cy="223307"/>
+            <a:chOff x="3599205" y="2688588"/>
+            <a:chExt cx="1212230" cy="223307"/>
+          </a:xfrm>
+        </p:grpSpPr>
+        <p:pic>
+          <p:nvPicPr>
+            <p:cNvPr id="1049" name="Picture 4" descr="카카오스탁MAP X 두나무투자일임 투자세미나 &lt;8인8색 주식 투자 이야기&gt; - 이벤터스">
+              <a:extLst>
+                <a:ext uri="{FF2B5EF4-FFF2-40B4-BE49-F238E27FC236}">
+                  <a16:creationId xmlns:a16="http://schemas.microsoft.com/office/drawing/2014/main" id="{B32035EB-E9DE-AB51-D757-2125309D00D1}"/>
+                </a:ext>
+              </a:extLst>
+            </p:cNvPr>
+            <p:cNvPicPr>
+              <a:picLocks noChangeAspect="1" noChangeArrowheads="1"/>
+            </p:cNvPicPr>
+            <p:nvPr/>
+          </p:nvPicPr>
+          <p:blipFill>
+            <a:blip r:embed="rId15">
+              <a:extLst>
+                <a:ext uri="{28A0092B-C50C-407E-A947-70E740481C1C}">
+                  <a14:useLocalDpi xmlns:a14="http://schemas.microsoft.com/office/drawing/2010/main" val="0"/>
+                </a:ext>
+              </a:extLst>
+            </a:blip>
+            <a:srcRect/>
+            <a:stretch>
+              <a:fillRect/>
+            </a:stretch>
+          </p:blipFill>
+          <p:spPr bwMode="auto">
+            <a:xfrm>
+              <a:off x="3599205" y="2688588"/>
+              <a:ext cx="396990" cy="223307"/>
+            </a:xfrm>
+            <a:prstGeom prst="rect">
+              <a:avLst/>
+            </a:prstGeom>
+            <a:noFill/>
+            <a:extLst>
+              <a:ext uri="{909E8E84-426E-40DD-AFC4-6F175D3DCCD1}">
+                <a14:hiddenFill xmlns:a14="http://schemas.microsoft.com/office/drawing/2010/main">
+                  <a:solidFill>
+                    <a:srgbClr val="FFFFFF"/>
+                  </a:solidFill>
+                </a14:hiddenFill>
+              </a:ext>
+            </a:extLst>
+          </p:spPr>
+        </p:pic>
+        <p:sp>
+          <p:nvSpPr>
+            <p:cNvPr id="1077" name="TextBox 1076">
+              <a:extLst>
+                <a:ext uri="{FF2B5EF4-FFF2-40B4-BE49-F238E27FC236}">
+                  <a16:creationId xmlns:a16="http://schemas.microsoft.com/office/drawing/2014/main" id="{555E43E6-73E9-37D0-B2CC-42A1FB898E7D}"/>
+                </a:ext>
+              </a:extLst>
+            </p:cNvPr>
+            <p:cNvSpPr txBox="1"/>
+            <p:nvPr/>
+          </p:nvSpPr>
+          <p:spPr>
+            <a:xfrm>
+              <a:off x="3993435" y="2702425"/>
+              <a:ext cx="818000" cy="169277"/>
+            </a:xfrm>
+            <a:prstGeom prst="rect">
+              <a:avLst/>
+            </a:prstGeom>
+            <a:noFill/>
+          </p:spPr>
+          <p:txBody>
+            <a:bodyPr wrap="square" rtlCol="0">
+              <a:spAutoFit/>
+            </a:bodyPr>
+            <a:lstStyle/>
+            <a:p>
+              <a:r>
+                <a:rPr lang="ko-KR" altLang="en-US" sz="500">
+                  <a:latin typeface="JejuGothic" panose="02000300000000000000" pitchFamily="2" charset="-127"/>
+                  <a:ea typeface="JejuGothic" panose="02000300000000000000" pitchFamily="2" charset="-127"/>
+                </a:rPr>
+                <a:t>두나무 박충원</a:t>
+              </a:r>
+              <a:endParaRPr lang="ko-KR" altLang="en-US" sz="500" dirty="0">
+                <a:latin typeface="JejuGothic" panose="02000300000000000000" pitchFamily="2" charset="-127"/>
+                <a:ea typeface="JejuGothic" panose="02000300000000000000" pitchFamily="2" charset="-127"/>
+              </a:endParaRPr>
+            </a:p>
+          </p:txBody>
+        </p:sp>
+      </p:grpSp>
+      <p:grpSp>
+        <p:nvGrpSpPr>
+          <p:cNvPr id="28" name="그룹 27">
+            <a:extLst>
+              <a:ext uri="{FF2B5EF4-FFF2-40B4-BE49-F238E27FC236}">
+                <a16:creationId xmlns:a16="http://schemas.microsoft.com/office/drawing/2014/main" id="{0BC824F1-2B37-23A9-7CAA-C83C08A32D4C}"/>
+              </a:ext>
+            </a:extLst>
+          </p:cNvPr>
+          <p:cNvGrpSpPr/>
+          <p:nvPr/>
+        </p:nvGrpSpPr>
+        <p:grpSpPr>
+          <a:xfrm>
+            <a:off x="3838543" y="1446660"/>
+            <a:ext cx="969845" cy="169277"/>
+            <a:chOff x="3838543" y="1931556"/>
+            <a:chExt cx="969845" cy="169277"/>
+          </a:xfrm>
+        </p:grpSpPr>
         <p:sp>
           <p:nvSpPr>
             <p:cNvPr id="1073" name="TextBox 1072">
@@ -7596,6 +8127,62 @@
             </a:p>
           </p:txBody>
         </p:sp>
+        <p:pic>
+          <p:nvPicPr>
+            <p:cNvPr id="1099" name="그림 1098">
+              <a:extLst>
+                <a:ext uri="{FF2B5EF4-FFF2-40B4-BE49-F238E27FC236}">
+                  <a16:creationId xmlns:a16="http://schemas.microsoft.com/office/drawing/2014/main" id="{8DF8CA21-C3E2-C282-7002-6AFE6F87411A}"/>
+                </a:ext>
+              </a:extLst>
+            </p:cNvPr>
+            <p:cNvPicPr>
+              <a:picLocks noChangeAspect="1"/>
+            </p:cNvPicPr>
+            <p:nvPr/>
+          </p:nvPicPr>
+          <p:blipFill rotWithShape="1">
+            <a:blip r:embed="rId9">
+              <a:extLst>
+                <a:ext uri="{28A0092B-C50C-407E-A947-70E740481C1C}">
+                  <a14:useLocalDpi xmlns:a14="http://schemas.microsoft.com/office/drawing/2010/main" val="0"/>
+                </a:ext>
+              </a:extLst>
+            </a:blip>
+            <a:srcRect l="13117" t="15493" r="12280" b="11649"/>
+            <a:stretch/>
+          </p:blipFill>
+          <p:spPr>
+            <a:xfrm>
+              <a:off x="3838543" y="1953484"/>
+              <a:ext cx="126881" cy="114382"/>
+            </a:xfrm>
+            <a:prstGeom prst="rect">
+              <a:avLst/>
+            </a:prstGeom>
+          </p:spPr>
+        </p:pic>
+      </p:grpSp>
+      <p:grpSp>
+        <p:nvGrpSpPr>
+          <p:cNvPr id="41" name="그룹 40">
+            <a:extLst>
+              <a:ext uri="{FF2B5EF4-FFF2-40B4-BE49-F238E27FC236}">
+                <a16:creationId xmlns:a16="http://schemas.microsoft.com/office/drawing/2014/main" id="{A645A400-BF93-4B60-44D8-078E71405E10}"/>
+              </a:ext>
+            </a:extLst>
+          </p:cNvPr>
+          <p:cNvGrpSpPr/>
+          <p:nvPr/>
+        </p:nvGrpSpPr>
+        <p:grpSpPr>
+          <a:xfrm>
+            <a:off x="3838543" y="1626065"/>
+            <a:ext cx="969845" cy="169277"/>
+            <a:chOff x="3838543" y="2124302"/>
+            <a:chExt cx="969845" cy="169277"/>
+          </a:xfrm>
+        </p:grpSpPr>
         <p:sp>
           <p:nvSpPr>
             <p:cNvPr id="1074" name="TextBox 1073">
@@ -7645,6 +8232,167 @@
             </a:p>
           </p:txBody>
         </p:sp>
+        <p:pic>
+          <p:nvPicPr>
+            <p:cNvPr id="1102" name="그림 1101">
+              <a:extLst>
+                <a:ext uri="{FF2B5EF4-FFF2-40B4-BE49-F238E27FC236}">
+                  <a16:creationId xmlns:a16="http://schemas.microsoft.com/office/drawing/2014/main" id="{14236104-3C0A-B478-3614-604CC4FCC1FB}"/>
+                </a:ext>
+              </a:extLst>
+            </p:cNvPr>
+            <p:cNvPicPr>
+              <a:picLocks noChangeAspect="1"/>
+            </p:cNvPicPr>
+            <p:nvPr/>
+          </p:nvPicPr>
+          <p:blipFill rotWithShape="1">
+            <a:blip r:embed="rId9">
+              <a:extLst>
+                <a:ext uri="{28A0092B-C50C-407E-A947-70E740481C1C}">
+                  <a14:useLocalDpi xmlns:a14="http://schemas.microsoft.com/office/drawing/2010/main" val="0"/>
+                </a:ext>
+              </a:extLst>
+            </a:blip>
+            <a:srcRect l="13117" t="15493" r="12280" b="11649"/>
+            <a:stretch/>
+          </p:blipFill>
+          <p:spPr>
+            <a:xfrm>
+              <a:off x="3838543" y="2146625"/>
+              <a:ext cx="126881" cy="114382"/>
+            </a:xfrm>
+            <a:prstGeom prst="rect">
+              <a:avLst/>
+            </a:prstGeom>
+          </p:spPr>
+        </p:pic>
+      </p:grpSp>
+      <p:grpSp>
+        <p:nvGrpSpPr>
+          <p:cNvPr id="45" name="그룹 44">
+            <a:extLst>
+              <a:ext uri="{FF2B5EF4-FFF2-40B4-BE49-F238E27FC236}">
+                <a16:creationId xmlns:a16="http://schemas.microsoft.com/office/drawing/2014/main" id="{5F708A21-ADD1-8BB7-0B38-FE1F05BC4BDE}"/>
+              </a:ext>
+            </a:extLst>
+          </p:cNvPr>
+          <p:cNvGrpSpPr/>
+          <p:nvPr/>
+        </p:nvGrpSpPr>
+        <p:grpSpPr>
+          <a:xfrm>
+            <a:off x="3838543" y="1984875"/>
+            <a:ext cx="969845" cy="169277"/>
+            <a:chOff x="3838543" y="2509794"/>
+            <a:chExt cx="969845" cy="169277"/>
+          </a:xfrm>
+        </p:grpSpPr>
+        <p:sp>
+          <p:nvSpPr>
+            <p:cNvPr id="1076" name="TextBox 1075">
+              <a:extLst>
+                <a:ext uri="{FF2B5EF4-FFF2-40B4-BE49-F238E27FC236}">
+                  <a16:creationId xmlns:a16="http://schemas.microsoft.com/office/drawing/2014/main" id="{02332B6F-6215-25DD-4BDB-1B3D83E685D4}"/>
+                </a:ext>
+              </a:extLst>
+            </p:cNvPr>
+            <p:cNvSpPr txBox="1"/>
+            <p:nvPr/>
+          </p:nvSpPr>
+          <p:spPr>
+            <a:xfrm>
+              <a:off x="3993246" y="2509794"/>
+              <a:ext cx="815142" cy="169277"/>
+            </a:xfrm>
+            <a:prstGeom prst="rect">
+              <a:avLst/>
+            </a:prstGeom>
+            <a:noFill/>
+          </p:spPr>
+          <p:txBody>
+            <a:bodyPr wrap="square" rtlCol="0">
+              <a:spAutoFit/>
+            </a:bodyPr>
+            <a:lstStyle/>
+            <a:p>
+              <a:r>
+                <a:rPr lang="en-US" altLang="ko-KR" sz="500">
+                  <a:latin typeface="JejuGothic" panose="02000300000000000000" pitchFamily="2" charset="-127"/>
+                  <a:ea typeface="JejuGothic" panose="02000300000000000000" pitchFamily="2" charset="-127"/>
+                </a:rPr>
+                <a:t>KT </a:t>
+              </a:r>
+              <a:r>
+                <a:rPr lang="ko-KR" altLang="en-US" sz="500">
+                  <a:latin typeface="JejuGothic" panose="02000300000000000000" pitchFamily="2" charset="-127"/>
+                  <a:ea typeface="JejuGothic" panose="02000300000000000000" pitchFamily="2" charset="-127"/>
+                </a:rPr>
+                <a:t>허태훈</a:t>
+              </a:r>
+              <a:endParaRPr lang="ko-KR" altLang="en-US" sz="500" dirty="0">
+                <a:latin typeface="JejuGothic" panose="02000300000000000000" pitchFamily="2" charset="-127"/>
+                <a:ea typeface="JejuGothic" panose="02000300000000000000" pitchFamily="2" charset="-127"/>
+              </a:endParaRPr>
+            </a:p>
+          </p:txBody>
+        </p:sp>
+        <p:pic>
+          <p:nvPicPr>
+            <p:cNvPr id="1103" name="그림 1102">
+              <a:extLst>
+                <a:ext uri="{FF2B5EF4-FFF2-40B4-BE49-F238E27FC236}">
+                  <a16:creationId xmlns:a16="http://schemas.microsoft.com/office/drawing/2014/main" id="{5A560C3A-1ECB-48B7-5028-B9EC31A2BA22}"/>
+                </a:ext>
+              </a:extLst>
+            </p:cNvPr>
+            <p:cNvPicPr>
+              <a:picLocks noChangeAspect="1"/>
+            </p:cNvPicPr>
+            <p:nvPr/>
+          </p:nvPicPr>
+          <p:blipFill rotWithShape="1">
+            <a:blip r:embed="rId9">
+              <a:extLst>
+                <a:ext uri="{28A0092B-C50C-407E-A947-70E740481C1C}">
+                  <a14:useLocalDpi xmlns:a14="http://schemas.microsoft.com/office/drawing/2010/main" val="0"/>
+                </a:ext>
+              </a:extLst>
+            </a:blip>
+            <a:srcRect l="13117" t="15493" r="12280" b="11649"/>
+            <a:stretch/>
+          </p:blipFill>
+          <p:spPr>
+            <a:xfrm>
+              <a:off x="3838543" y="2532428"/>
+              <a:ext cx="126881" cy="114382"/>
+            </a:xfrm>
+            <a:prstGeom prst="rect">
+              <a:avLst/>
+            </a:prstGeom>
+          </p:spPr>
+        </p:pic>
+      </p:grpSp>
+      <p:grpSp>
+        <p:nvGrpSpPr>
+          <p:cNvPr id="42" name="그룹 41">
+            <a:extLst>
+              <a:ext uri="{FF2B5EF4-FFF2-40B4-BE49-F238E27FC236}">
+                <a16:creationId xmlns:a16="http://schemas.microsoft.com/office/drawing/2014/main" id="{ADF0B070-14A3-A5A6-3DCF-2A0C00D60F74}"/>
+              </a:ext>
+            </a:extLst>
+          </p:cNvPr>
+          <p:cNvGrpSpPr/>
+          <p:nvPr/>
+        </p:nvGrpSpPr>
+        <p:grpSpPr>
+          <a:xfrm>
+            <a:off x="3780255" y="1805470"/>
+            <a:ext cx="1028133" cy="169277"/>
+            <a:chOff x="3780255" y="2317048"/>
+            <a:chExt cx="1028133" cy="169277"/>
+          </a:xfrm>
+        </p:grpSpPr>
         <p:sp>
           <p:nvSpPr>
             <p:cNvPr id="1075" name="TextBox 1074">
@@ -7694,202 +8442,6 @@
             </a:p>
           </p:txBody>
         </p:sp>
-        <p:sp>
-          <p:nvSpPr>
-            <p:cNvPr id="1076" name="TextBox 1075">
-              <a:extLst>
-                <a:ext uri="{FF2B5EF4-FFF2-40B4-BE49-F238E27FC236}">
-                  <a16:creationId xmlns:a16="http://schemas.microsoft.com/office/drawing/2014/main" id="{02332B6F-6215-25DD-4BDB-1B3D83E685D4}"/>
-                </a:ext>
-              </a:extLst>
-            </p:cNvPr>
-            <p:cNvSpPr txBox="1"/>
-            <p:nvPr/>
-          </p:nvSpPr>
-          <p:spPr>
-            <a:xfrm>
-              <a:off x="3993246" y="2509794"/>
-              <a:ext cx="815142" cy="169277"/>
-            </a:xfrm>
-            <a:prstGeom prst="rect">
-              <a:avLst/>
-            </a:prstGeom>
-            <a:noFill/>
-          </p:spPr>
-          <p:txBody>
-            <a:bodyPr wrap="square" rtlCol="0">
-              <a:spAutoFit/>
-            </a:bodyPr>
-            <a:lstStyle/>
-            <a:p>
-              <a:r>
-                <a:rPr lang="en-US" altLang="ko-KR" sz="500">
-                  <a:latin typeface="JejuGothic" panose="02000300000000000000" pitchFamily="2" charset="-127"/>
-                  <a:ea typeface="JejuGothic" panose="02000300000000000000" pitchFamily="2" charset="-127"/>
-                </a:rPr>
-                <a:t>KT </a:t>
-              </a:r>
-              <a:r>
-                <a:rPr lang="ko-KR" altLang="en-US" sz="500">
-                  <a:latin typeface="JejuGothic" panose="02000300000000000000" pitchFamily="2" charset="-127"/>
-                  <a:ea typeface="JejuGothic" panose="02000300000000000000" pitchFamily="2" charset="-127"/>
-                </a:rPr>
-                <a:t>허태훈</a:t>
-              </a:r>
-              <a:endParaRPr lang="ko-KR" altLang="en-US" sz="500" dirty="0">
-                <a:latin typeface="JejuGothic" panose="02000300000000000000" pitchFamily="2" charset="-127"/>
-                <a:ea typeface="JejuGothic" panose="02000300000000000000" pitchFamily="2" charset="-127"/>
-              </a:endParaRPr>
-            </a:p>
-          </p:txBody>
-        </p:sp>
-        <p:sp>
-          <p:nvSpPr>
-            <p:cNvPr id="1077" name="TextBox 1076">
-              <a:extLst>
-                <a:ext uri="{FF2B5EF4-FFF2-40B4-BE49-F238E27FC236}">
-                  <a16:creationId xmlns:a16="http://schemas.microsoft.com/office/drawing/2014/main" id="{555E43E6-73E9-37D0-B2CC-42A1FB898E7D}"/>
-                </a:ext>
-              </a:extLst>
-            </p:cNvPr>
-            <p:cNvSpPr txBox="1"/>
-            <p:nvPr/>
-          </p:nvSpPr>
-          <p:spPr>
-            <a:xfrm>
-              <a:off x="3993435" y="2702425"/>
-              <a:ext cx="818000" cy="169277"/>
-            </a:xfrm>
-            <a:prstGeom prst="rect">
-              <a:avLst/>
-            </a:prstGeom>
-            <a:noFill/>
-          </p:spPr>
-          <p:txBody>
-            <a:bodyPr wrap="square" rtlCol="0">
-              <a:spAutoFit/>
-            </a:bodyPr>
-            <a:lstStyle/>
-            <a:p>
-              <a:r>
-                <a:rPr lang="ko-KR" altLang="en-US" sz="500">
-                  <a:latin typeface="JejuGothic" panose="02000300000000000000" pitchFamily="2" charset="-127"/>
-                  <a:ea typeface="JejuGothic" panose="02000300000000000000" pitchFamily="2" charset="-127"/>
-                </a:rPr>
-                <a:t>두나무 박충원</a:t>
-              </a:r>
-              <a:endParaRPr lang="ko-KR" altLang="en-US" sz="500" dirty="0">
-                <a:latin typeface="JejuGothic" panose="02000300000000000000" pitchFamily="2" charset="-127"/>
-                <a:ea typeface="JejuGothic" panose="02000300000000000000" pitchFamily="2" charset="-127"/>
-              </a:endParaRPr>
-            </a:p>
-          </p:txBody>
-        </p:sp>
-        <p:pic>
-          <p:nvPicPr>
-            <p:cNvPr id="1099" name="그림 1098">
-              <a:extLst>
-                <a:ext uri="{FF2B5EF4-FFF2-40B4-BE49-F238E27FC236}">
-                  <a16:creationId xmlns:a16="http://schemas.microsoft.com/office/drawing/2014/main" id="{8DF8CA21-C3E2-C282-7002-6AFE6F87411A}"/>
-                </a:ext>
-              </a:extLst>
-            </p:cNvPr>
-            <p:cNvPicPr>
-              <a:picLocks noChangeAspect="1"/>
-            </p:cNvPicPr>
-            <p:nvPr/>
-          </p:nvPicPr>
-          <p:blipFill rotWithShape="1">
-            <a:blip r:embed="rId9">
-              <a:extLst>
-                <a:ext uri="{28A0092B-C50C-407E-A947-70E740481C1C}">
-                  <a14:useLocalDpi xmlns:a14="http://schemas.microsoft.com/office/drawing/2010/main" val="0"/>
-                </a:ext>
-              </a:extLst>
-            </a:blip>
-            <a:srcRect l="13117" t="15493" r="12280" b="11649"/>
-            <a:stretch/>
-          </p:blipFill>
-          <p:spPr>
-            <a:xfrm>
-              <a:off x="3838543" y="1953484"/>
-              <a:ext cx="126881" cy="114382"/>
-            </a:xfrm>
-            <a:prstGeom prst="rect">
-              <a:avLst/>
-            </a:prstGeom>
-          </p:spPr>
-        </p:pic>
-        <p:pic>
-          <p:nvPicPr>
-            <p:cNvPr id="1102" name="그림 1101">
-              <a:extLst>
-                <a:ext uri="{FF2B5EF4-FFF2-40B4-BE49-F238E27FC236}">
-                  <a16:creationId xmlns:a16="http://schemas.microsoft.com/office/drawing/2014/main" id="{14236104-3C0A-B478-3614-604CC4FCC1FB}"/>
-                </a:ext>
-              </a:extLst>
-            </p:cNvPr>
-            <p:cNvPicPr>
-              <a:picLocks noChangeAspect="1"/>
-            </p:cNvPicPr>
-            <p:nvPr/>
-          </p:nvPicPr>
-          <p:blipFill rotWithShape="1">
-            <a:blip r:embed="rId9">
-              <a:extLst>
-                <a:ext uri="{28A0092B-C50C-407E-A947-70E740481C1C}">
-                  <a14:useLocalDpi xmlns:a14="http://schemas.microsoft.com/office/drawing/2010/main" val="0"/>
-                </a:ext>
-              </a:extLst>
-            </a:blip>
-            <a:srcRect l="13117" t="15493" r="12280" b="11649"/>
-            <a:stretch/>
-          </p:blipFill>
-          <p:spPr>
-            <a:xfrm>
-              <a:off x="3838543" y="2146625"/>
-              <a:ext cx="126881" cy="114382"/>
-            </a:xfrm>
-            <a:prstGeom prst="rect">
-              <a:avLst/>
-            </a:prstGeom>
-          </p:spPr>
-        </p:pic>
-        <p:pic>
-          <p:nvPicPr>
-            <p:cNvPr id="1103" name="그림 1102">
-              <a:extLst>
-                <a:ext uri="{FF2B5EF4-FFF2-40B4-BE49-F238E27FC236}">
-                  <a16:creationId xmlns:a16="http://schemas.microsoft.com/office/drawing/2014/main" id="{5A560C3A-1ECB-48B7-5028-B9EC31A2BA22}"/>
-                </a:ext>
-              </a:extLst>
-            </p:cNvPr>
-            <p:cNvPicPr>
-              <a:picLocks noChangeAspect="1"/>
-            </p:cNvPicPr>
-            <p:nvPr/>
-          </p:nvPicPr>
-          <p:blipFill rotWithShape="1">
-            <a:blip r:embed="rId9">
-              <a:extLst>
-                <a:ext uri="{28A0092B-C50C-407E-A947-70E740481C1C}">
-                  <a14:useLocalDpi xmlns:a14="http://schemas.microsoft.com/office/drawing/2010/main" val="0"/>
-                </a:ext>
-              </a:extLst>
-            </a:blip>
-            <a:srcRect l="13117" t="15493" r="12280" b="11649"/>
-            <a:stretch/>
-          </p:blipFill>
-          <p:spPr>
-            <a:xfrm>
-              <a:off x="3838543" y="2532428"/>
-              <a:ext cx="126881" cy="114382"/>
-            </a:xfrm>
-            <a:prstGeom prst="rect">
-              <a:avLst/>
-            </a:prstGeom>
-          </p:spPr>
-        </p:pic>
         <p:pic>
           <p:nvPicPr>
             <p:cNvPr id="1104" name="그림 1103">
@@ -7920,6 +8472,410 @@
             <a:xfrm>
               <a:off x="3780255" y="2351125"/>
               <a:ext cx="187529" cy="102072"/>
+            </a:xfrm>
+            <a:prstGeom prst="rect">
+              <a:avLst/>
+            </a:prstGeom>
+          </p:spPr>
+        </p:pic>
+      </p:grpSp>
+      <p:grpSp>
+        <p:nvGrpSpPr>
+          <p:cNvPr id="95" name="그룹 94">
+            <a:extLst>
+              <a:ext uri="{FF2B5EF4-FFF2-40B4-BE49-F238E27FC236}">
+                <a16:creationId xmlns:a16="http://schemas.microsoft.com/office/drawing/2014/main" id="{900677B6-2351-4406-6E8C-17AC3E684F31}"/>
+              </a:ext>
+            </a:extLst>
+          </p:cNvPr>
+          <p:cNvGrpSpPr/>
+          <p:nvPr/>
+        </p:nvGrpSpPr>
+        <p:grpSpPr>
+          <a:xfrm>
+            <a:off x="3838543" y="2935926"/>
+            <a:ext cx="969845" cy="169277"/>
+            <a:chOff x="3838543" y="2895242"/>
+            <a:chExt cx="969845" cy="169277"/>
+          </a:xfrm>
+        </p:grpSpPr>
+        <p:sp>
+          <p:nvSpPr>
+            <p:cNvPr id="43" name="TextBox 42">
+              <a:extLst>
+                <a:ext uri="{FF2B5EF4-FFF2-40B4-BE49-F238E27FC236}">
+                  <a16:creationId xmlns:a16="http://schemas.microsoft.com/office/drawing/2014/main" id="{CCD08C97-1EA2-3C10-A5B3-421440AC9789}"/>
+                </a:ext>
+              </a:extLst>
+            </p:cNvPr>
+            <p:cNvSpPr txBox="1"/>
+            <p:nvPr/>
+          </p:nvSpPr>
+          <p:spPr>
+            <a:xfrm>
+              <a:off x="3993246" y="2895242"/>
+              <a:ext cx="815142" cy="169277"/>
+            </a:xfrm>
+            <a:prstGeom prst="rect">
+              <a:avLst/>
+            </a:prstGeom>
+            <a:noFill/>
+          </p:spPr>
+          <p:txBody>
+            <a:bodyPr wrap="square" rtlCol="0">
+              <a:spAutoFit/>
+            </a:bodyPr>
+            <a:lstStyle/>
+            <a:p>
+              <a:r>
+                <a:rPr lang="en-US" altLang="ko-KR" sz="500">
+                  <a:latin typeface="JejuGothic" panose="02000300000000000000" pitchFamily="2" charset="-127"/>
+                  <a:ea typeface="JejuGothic" panose="02000300000000000000" pitchFamily="2" charset="-127"/>
+                </a:rPr>
+                <a:t>KT </a:t>
+              </a:r>
+              <a:r>
+                <a:rPr lang="ko-KR" altLang="en-US" sz="500">
+                  <a:latin typeface="JejuGothic" panose="02000300000000000000" pitchFamily="2" charset="-127"/>
+                  <a:ea typeface="JejuGothic" panose="02000300000000000000" pitchFamily="2" charset="-127"/>
+                </a:rPr>
+                <a:t>이홍희</a:t>
+              </a:r>
+              <a:endParaRPr lang="ko-KR" altLang="en-US" sz="500" dirty="0">
+                <a:latin typeface="JejuGothic" panose="02000300000000000000" pitchFamily="2" charset="-127"/>
+                <a:ea typeface="JejuGothic" panose="02000300000000000000" pitchFamily="2" charset="-127"/>
+              </a:endParaRPr>
+            </a:p>
+          </p:txBody>
+        </p:sp>
+        <p:pic>
+          <p:nvPicPr>
+            <p:cNvPr id="44" name="그림 43">
+              <a:extLst>
+                <a:ext uri="{FF2B5EF4-FFF2-40B4-BE49-F238E27FC236}">
+                  <a16:creationId xmlns:a16="http://schemas.microsoft.com/office/drawing/2014/main" id="{6FE624DC-C3E1-AC57-C166-07D498F1C78F}"/>
+                </a:ext>
+              </a:extLst>
+            </p:cNvPr>
+            <p:cNvPicPr>
+              <a:picLocks noChangeAspect="1"/>
+            </p:cNvPicPr>
+            <p:nvPr/>
+          </p:nvPicPr>
+          <p:blipFill rotWithShape="1">
+            <a:blip r:embed="rId9">
+              <a:extLst>
+                <a:ext uri="{28A0092B-C50C-407E-A947-70E740481C1C}">
+                  <a14:useLocalDpi xmlns:a14="http://schemas.microsoft.com/office/drawing/2010/main" val="0"/>
+                </a:ext>
+              </a:extLst>
+            </a:blip>
+            <a:srcRect l="13117" t="15493" r="12280" b="11649"/>
+            <a:stretch/>
+          </p:blipFill>
+          <p:spPr>
+            <a:xfrm>
+              <a:off x="3838543" y="2917876"/>
+              <a:ext cx="126881" cy="114382"/>
+            </a:xfrm>
+            <a:prstGeom prst="rect">
+              <a:avLst/>
+            </a:prstGeom>
+          </p:spPr>
+        </p:pic>
+      </p:grpSp>
+      <p:grpSp>
+        <p:nvGrpSpPr>
+          <p:cNvPr id="86" name="그룹 85">
+            <a:extLst>
+              <a:ext uri="{FF2B5EF4-FFF2-40B4-BE49-F238E27FC236}">
+                <a16:creationId xmlns:a16="http://schemas.microsoft.com/office/drawing/2014/main" id="{9316EAFE-686D-53C8-6256-039EDC44E157}"/>
+              </a:ext>
+            </a:extLst>
+          </p:cNvPr>
+          <p:cNvGrpSpPr/>
+          <p:nvPr/>
+        </p:nvGrpSpPr>
+        <p:grpSpPr>
+          <a:xfrm>
+            <a:off x="3621882" y="2397715"/>
+            <a:ext cx="1186506" cy="169277"/>
+            <a:chOff x="3621882" y="2350556"/>
+            <a:chExt cx="1186506" cy="169277"/>
+          </a:xfrm>
+        </p:grpSpPr>
+        <p:sp>
+          <p:nvSpPr>
+            <p:cNvPr id="62" name="TextBox 61">
+              <a:extLst>
+                <a:ext uri="{FF2B5EF4-FFF2-40B4-BE49-F238E27FC236}">
+                  <a16:creationId xmlns:a16="http://schemas.microsoft.com/office/drawing/2014/main" id="{EB410E61-62BE-B398-CBB8-DE65605353FE}"/>
+                </a:ext>
+              </a:extLst>
+            </p:cNvPr>
+            <p:cNvSpPr txBox="1"/>
+            <p:nvPr/>
+          </p:nvSpPr>
+          <p:spPr>
+            <a:xfrm>
+              <a:off x="3993246" y="2350556"/>
+              <a:ext cx="815142" cy="169277"/>
+            </a:xfrm>
+            <a:prstGeom prst="rect">
+              <a:avLst/>
+            </a:prstGeom>
+            <a:noFill/>
+          </p:spPr>
+          <p:txBody>
+            <a:bodyPr wrap="none" rtlCol="0">
+              <a:noAutofit/>
+            </a:bodyPr>
+            <a:lstStyle/>
+            <a:p>
+              <a:r>
+                <a:rPr lang="en-US" altLang="ko-KR" sz="500">
+                  <a:latin typeface="JejuGothic" panose="02000300000000000000" pitchFamily="2" charset="-127"/>
+                  <a:ea typeface="JejuGothic" panose="02000300000000000000" pitchFamily="2" charset="-127"/>
+                </a:rPr>
+                <a:t>POSCO Hodings </a:t>
+              </a:r>
+              <a:r>
+                <a:rPr lang="ko-KR" altLang="en-US" sz="500">
+                  <a:latin typeface="JejuGothic" panose="02000300000000000000" pitchFamily="2" charset="-127"/>
+                  <a:ea typeface="JejuGothic" panose="02000300000000000000" pitchFamily="2" charset="-127"/>
+                </a:rPr>
+                <a:t>최규리</a:t>
+              </a:r>
+              <a:endParaRPr lang="ko-KR" altLang="en-US" sz="500" dirty="0">
+                <a:latin typeface="JejuGothic" panose="02000300000000000000" pitchFamily="2" charset="-127"/>
+                <a:ea typeface="JejuGothic" panose="02000300000000000000" pitchFamily="2" charset="-127"/>
+              </a:endParaRPr>
+            </a:p>
+          </p:txBody>
+        </p:sp>
+        <p:pic>
+          <p:nvPicPr>
+            <p:cNvPr id="81" name="그림 80">
+              <a:extLst>
+                <a:ext uri="{FF2B5EF4-FFF2-40B4-BE49-F238E27FC236}">
+                  <a16:creationId xmlns:a16="http://schemas.microsoft.com/office/drawing/2014/main" id="{E29360ED-7EF6-212D-9A65-0466B6C42B59}"/>
+                </a:ext>
+              </a:extLst>
+            </p:cNvPr>
+            <p:cNvPicPr>
+              <a:picLocks noChangeAspect="1"/>
+            </p:cNvPicPr>
+            <p:nvPr/>
+          </p:nvPicPr>
+          <p:blipFill>
+            <a:blip r:embed="rId16"/>
+            <a:stretch>
+              <a:fillRect/>
+            </a:stretch>
+          </p:blipFill>
+          <p:spPr>
+            <a:xfrm>
+              <a:off x="3621882" y="2364934"/>
+              <a:ext cx="351300" cy="140520"/>
+            </a:xfrm>
+            <a:prstGeom prst="rect">
+              <a:avLst/>
+            </a:prstGeom>
+          </p:spPr>
+        </p:pic>
+      </p:grpSp>
+      <p:grpSp>
+        <p:nvGrpSpPr>
+          <p:cNvPr id="97" name="그룹 96">
+            <a:extLst>
+              <a:ext uri="{FF2B5EF4-FFF2-40B4-BE49-F238E27FC236}">
+                <a16:creationId xmlns:a16="http://schemas.microsoft.com/office/drawing/2014/main" id="{3F22EEC5-835C-AC52-6F5D-CEF77AE0D36F}"/>
+              </a:ext>
+            </a:extLst>
+          </p:cNvPr>
+          <p:cNvGrpSpPr/>
+          <p:nvPr/>
+        </p:nvGrpSpPr>
+        <p:grpSpPr>
+          <a:xfrm>
+            <a:off x="3594835" y="2577120"/>
+            <a:ext cx="1213553" cy="169277"/>
+            <a:chOff x="3594835" y="2537881"/>
+            <a:chExt cx="1213553" cy="169277"/>
+          </a:xfrm>
+        </p:grpSpPr>
+        <p:sp>
+          <p:nvSpPr>
+            <p:cNvPr id="63" name="TextBox 62">
+              <a:extLst>
+                <a:ext uri="{FF2B5EF4-FFF2-40B4-BE49-F238E27FC236}">
+                  <a16:creationId xmlns:a16="http://schemas.microsoft.com/office/drawing/2014/main" id="{C6A46877-843A-95C0-778C-8C625E340C50}"/>
+                </a:ext>
+              </a:extLst>
+            </p:cNvPr>
+            <p:cNvSpPr txBox="1"/>
+            <p:nvPr/>
+          </p:nvSpPr>
+          <p:spPr>
+            <a:xfrm>
+              <a:off x="3993246" y="2537881"/>
+              <a:ext cx="815142" cy="169277"/>
+            </a:xfrm>
+            <a:prstGeom prst="rect">
+              <a:avLst/>
+            </a:prstGeom>
+            <a:noFill/>
+          </p:spPr>
+          <p:txBody>
+            <a:bodyPr wrap="square" rtlCol="0">
+              <a:spAutoFit/>
+            </a:bodyPr>
+            <a:lstStyle/>
+            <a:p>
+              <a:r>
+                <a:rPr lang="en-US" altLang="ko-KR" sz="500">
+                  <a:latin typeface="JejuGothic" panose="02000300000000000000" pitchFamily="2" charset="-127"/>
+                  <a:ea typeface="JejuGothic" panose="02000300000000000000" pitchFamily="2" charset="-127"/>
+                </a:rPr>
+                <a:t>Nexon </a:t>
+              </a:r>
+              <a:r>
+                <a:rPr lang="ko-KR" altLang="en-US" sz="500">
+                  <a:latin typeface="JejuGothic" panose="02000300000000000000" pitchFamily="2" charset="-127"/>
+                  <a:ea typeface="JejuGothic" panose="02000300000000000000" pitchFamily="2" charset="-127"/>
+                </a:rPr>
+                <a:t>장영재</a:t>
+              </a:r>
+              <a:endParaRPr lang="ko-KR" altLang="en-US" sz="500" dirty="0">
+                <a:latin typeface="JejuGothic" panose="02000300000000000000" pitchFamily="2" charset="-127"/>
+                <a:ea typeface="JejuGothic" panose="02000300000000000000" pitchFamily="2" charset="-127"/>
+              </a:endParaRPr>
+            </a:p>
+          </p:txBody>
+        </p:sp>
+        <p:pic>
+          <p:nvPicPr>
+            <p:cNvPr id="91" name="그림 90">
+              <a:extLst>
+                <a:ext uri="{FF2B5EF4-FFF2-40B4-BE49-F238E27FC236}">
+                  <a16:creationId xmlns:a16="http://schemas.microsoft.com/office/drawing/2014/main" id="{1582651E-A550-2B6F-4938-AC49D02C6E36}"/>
+                </a:ext>
+              </a:extLst>
+            </p:cNvPr>
+            <p:cNvPicPr>
+              <a:picLocks noChangeAspect="1"/>
+            </p:cNvPicPr>
+            <p:nvPr/>
+          </p:nvPicPr>
+          <p:blipFill>
+            <a:blip r:embed="rId17"/>
+            <a:stretch>
+              <a:fillRect/>
+            </a:stretch>
+          </p:blipFill>
+          <p:spPr>
+            <a:xfrm>
+              <a:off x="3594835" y="2581118"/>
+              <a:ext cx="382040" cy="116140"/>
+            </a:xfrm>
+            <a:prstGeom prst="rect">
+              <a:avLst/>
+            </a:prstGeom>
+          </p:spPr>
+        </p:pic>
+      </p:grpSp>
+      <p:grpSp>
+        <p:nvGrpSpPr>
+          <p:cNvPr id="96" name="그룹 95">
+            <a:extLst>
+              <a:ext uri="{FF2B5EF4-FFF2-40B4-BE49-F238E27FC236}">
+                <a16:creationId xmlns:a16="http://schemas.microsoft.com/office/drawing/2014/main" id="{84105939-428D-2D03-4728-017C1D3739EA}"/>
+              </a:ext>
+            </a:extLst>
+          </p:cNvPr>
+          <p:cNvGrpSpPr/>
+          <p:nvPr/>
+        </p:nvGrpSpPr>
+        <p:grpSpPr>
+          <a:xfrm>
+            <a:off x="3602252" y="2756525"/>
+            <a:ext cx="1206136" cy="169277"/>
+            <a:chOff x="3602252" y="2714691"/>
+            <a:chExt cx="1206136" cy="169277"/>
+          </a:xfrm>
+        </p:grpSpPr>
+        <p:sp>
+          <p:nvSpPr>
+            <p:cNvPr id="78" name="TextBox 77">
+              <a:extLst>
+                <a:ext uri="{FF2B5EF4-FFF2-40B4-BE49-F238E27FC236}">
+                  <a16:creationId xmlns:a16="http://schemas.microsoft.com/office/drawing/2014/main" id="{8223737C-A497-5990-AF53-82FB00954F3E}"/>
+                </a:ext>
+              </a:extLst>
+            </p:cNvPr>
+            <p:cNvSpPr txBox="1"/>
+            <p:nvPr/>
+          </p:nvSpPr>
+          <p:spPr>
+            <a:xfrm>
+              <a:off x="3993246" y="2714691"/>
+              <a:ext cx="815142" cy="169277"/>
+            </a:xfrm>
+            <a:prstGeom prst="rect">
+              <a:avLst/>
+            </a:prstGeom>
+            <a:noFill/>
+          </p:spPr>
+          <p:txBody>
+            <a:bodyPr wrap="square" rtlCol="0">
+              <a:spAutoFit/>
+            </a:bodyPr>
+            <a:lstStyle/>
+            <a:p>
+              <a:r>
+                <a:rPr lang="en-US" altLang="ko-KR" sz="500">
+                  <a:latin typeface="JejuGothic" panose="02000300000000000000" pitchFamily="2" charset="-127"/>
+                  <a:ea typeface="JejuGothic" panose="02000300000000000000" pitchFamily="2" charset="-127"/>
+                </a:rPr>
+                <a:t>Saltlux </a:t>
+              </a:r>
+              <a:r>
+                <a:rPr lang="ko-KR" altLang="en-US" sz="500">
+                  <a:latin typeface="JejuGothic" panose="02000300000000000000" pitchFamily="2" charset="-127"/>
+                  <a:ea typeface="JejuGothic" panose="02000300000000000000" pitchFamily="2" charset="-127"/>
+                </a:rPr>
+                <a:t>유재아</a:t>
+              </a:r>
+              <a:endParaRPr lang="ko-KR" altLang="en-US" sz="500" dirty="0">
+                <a:latin typeface="JejuGothic" panose="02000300000000000000" pitchFamily="2" charset="-127"/>
+                <a:ea typeface="JejuGothic" panose="02000300000000000000" pitchFamily="2" charset="-127"/>
+              </a:endParaRPr>
+            </a:p>
+          </p:txBody>
+        </p:sp>
+        <p:pic>
+          <p:nvPicPr>
+            <p:cNvPr id="93" name="그림 92">
+              <a:extLst>
+                <a:ext uri="{FF2B5EF4-FFF2-40B4-BE49-F238E27FC236}">
+                  <a16:creationId xmlns:a16="http://schemas.microsoft.com/office/drawing/2014/main" id="{FA27A2E4-3622-762F-D71D-A5EB4A99D09B}"/>
+                </a:ext>
+              </a:extLst>
+            </p:cNvPr>
+            <p:cNvPicPr>
+              <a:picLocks noChangeAspect="1"/>
+            </p:cNvPicPr>
+            <p:nvPr/>
+          </p:nvPicPr>
+          <p:blipFill rotWithShape="1">
+            <a:blip r:embed="rId18"/>
+            <a:srcRect b="35490"/>
+            <a:stretch/>
+          </p:blipFill>
+          <p:spPr>
+            <a:xfrm>
+              <a:off x="3602252" y="2739699"/>
+              <a:ext cx="377704" cy="96706"/>
             </a:xfrm>
             <a:prstGeom prst="rect">
               <a:avLst/>
@@ -9306,6 +10262,16 @@
               <a:buChar char="•"/>
             </a:pPr>
             <a:r>
+              <a:rPr lang="en-US" altLang="ko-KR" sz="800" b="1">
+                <a:solidFill>
+                  <a:srgbClr val="A52A2A"/>
+                </a:solidFill>
+                <a:latin typeface="제주고딕" panose="02000300000000000000" pitchFamily="2" charset="-127"/>
+                <a:ea typeface="제주고딕" panose="02000300000000000000" pitchFamily="2" charset="-127"/>
+              </a:rPr>
+              <a:t>DSTC10 </a:t>
+            </a:r>
+            <a:r>
               <a:rPr lang="en-US" altLang="ko-KR" sz="800" b="1" dirty="0">
                 <a:solidFill>
                   <a:srgbClr val="A52A2A"/>
@@ -9313,10 +10279,20 @@
                 <a:latin typeface="제주고딕" panose="02000300000000000000" pitchFamily="2" charset="-127"/>
                 <a:ea typeface="제주고딕" panose="02000300000000000000" pitchFamily="2" charset="-127"/>
               </a:rPr>
-              <a:t>DSTC9 Workshop of AAAI 2021</a:t>
-            </a:r>
-            <a:r>
-              <a:rPr lang="ko-KR" altLang="en-US" sz="800" dirty="0">
+              <a:t>Workshop of </a:t>
+            </a:r>
+            <a:r>
+              <a:rPr lang="en-US" altLang="ko-KR" sz="800" b="1">
+                <a:solidFill>
+                  <a:srgbClr val="A52A2A"/>
+                </a:solidFill>
+                <a:latin typeface="제주고딕" panose="02000300000000000000" pitchFamily="2" charset="-127"/>
+                <a:ea typeface="제주고딕" panose="02000300000000000000" pitchFamily="2" charset="-127"/>
+              </a:rPr>
+              <a:t>AAAI 2022</a:t>
+            </a:r>
+            <a:r>
+              <a:rPr lang="ko-KR" altLang="en-US" sz="800">
                 <a:latin typeface="제주고딕" panose="02000300000000000000" pitchFamily="2" charset="-127"/>
                 <a:ea typeface="제주고딕" panose="02000300000000000000" pitchFamily="2" charset="-127"/>
               </a:rPr>
@@ -9327,14 +10303,21 @@
                 <a:latin typeface="제주고딕" panose="02000300000000000000" pitchFamily="2" charset="-127"/>
                 <a:ea typeface="제주고딕" panose="02000300000000000000" pitchFamily="2" charset="-127"/>
               </a:rPr>
-              <a:t>2</a:t>
+              <a:t>3</a:t>
+            </a:r>
+            <a:r>
+              <a:rPr lang="ko-KR" altLang="en-US" sz="800" b="1">
+                <a:latin typeface="제주고딕" panose="02000300000000000000" pitchFamily="2" charset="-127"/>
+                <a:ea typeface="제주고딕" panose="02000300000000000000" pitchFamily="2" charset="-127"/>
+              </a:rPr>
+              <a:t>편의 </a:t>
             </a:r>
             <a:r>
               <a:rPr lang="ko-KR" altLang="en-US" sz="800" b="1" dirty="0">
                 <a:latin typeface="제주고딕" panose="02000300000000000000" pitchFamily="2" charset="-127"/>
                 <a:ea typeface="제주고딕" panose="02000300000000000000" pitchFamily="2" charset="-127"/>
               </a:rPr>
-              <a:t>편의 논문</a:t>
+              <a:t>논문</a:t>
             </a:r>
             <a:r>
               <a:rPr lang="ko-KR" altLang="en-US" sz="800" dirty="0">

</xml_diff>